<commit_message>
Scripts + PPTX completed
</commit_message>
<xml_diff>
--- a/VMUGBE-2020.pptx
+++ b/VMUGBE-2020.pptx
@@ -5,13 +5,29 @@
     <p:sldMasterId id="2147483648" r:id="rId4"/>
   </p:sldMasterIdLst>
   <p:notesMasterIdLst>
-    <p:notesMasterId r:id="rId9"/>
+    <p:notesMasterId r:id="rId25"/>
   </p:notesMasterIdLst>
   <p:sldIdLst>
     <p:sldId id="258" r:id="rId5"/>
-    <p:sldId id="259" r:id="rId6"/>
-    <p:sldId id="260" r:id="rId7"/>
-    <p:sldId id="261" r:id="rId8"/>
+    <p:sldId id="262" r:id="rId6"/>
+    <p:sldId id="259" r:id="rId7"/>
+    <p:sldId id="260" r:id="rId8"/>
+    <p:sldId id="261" r:id="rId9"/>
+    <p:sldId id="274" r:id="rId10"/>
+    <p:sldId id="273" r:id="rId11"/>
+    <p:sldId id="263" r:id="rId12"/>
+    <p:sldId id="275" r:id="rId13"/>
+    <p:sldId id="264" r:id="rId14"/>
+    <p:sldId id="270" r:id="rId15"/>
+    <p:sldId id="276" r:id="rId16"/>
+    <p:sldId id="265" r:id="rId17"/>
+    <p:sldId id="271" r:id="rId18"/>
+    <p:sldId id="277" r:id="rId19"/>
+    <p:sldId id="266" r:id="rId20"/>
+    <p:sldId id="278" r:id="rId21"/>
+    <p:sldId id="267" r:id="rId22"/>
+    <p:sldId id="268" r:id="rId23"/>
+    <p:sldId id="279" r:id="rId24"/>
   </p:sldIdLst>
   <p:sldSz cx="12192000" cy="6858000"/>
   <p:notesSz cx="6858000" cy="9144000"/>
@@ -205,7 +221,7 @@
             <a:fld id="{D61B49C3-BBB5-4830-A9E2-A5DEEA844FCF}" type="datetimeFigureOut">
               <a:rPr lang="en-US" smtClean="0"/>
               <a:pPr/>
-              <a:t>05-Oct-20</a:t>
+              <a:t>10/19/2020</a:t>
             </a:fld>
             <a:endParaRPr lang="en-US" dirty="0"/>
           </a:p>
@@ -581,7 +597,7 @@
             <a:fld id="{38DD4701-379E-4D60-972F-CC1085113D96}" type="datetimeFigureOut">
               <a:rPr lang="en-US" smtClean="0"/>
               <a:pPr/>
-              <a:t>05-Oct-20</a:t>
+              <a:t>10/19/2020</a:t>
             </a:fld>
             <a:endParaRPr lang="en-US" dirty="0"/>
           </a:p>
@@ -948,7 +964,7 @@
             <a:fld id="{38DD4701-379E-4D60-972F-CC1085113D96}" type="datetimeFigureOut">
               <a:rPr lang="en-US" smtClean="0"/>
               <a:pPr/>
-              <a:t>05-Oct-20</a:t>
+              <a:t>10/19/2020</a:t>
             </a:fld>
             <a:endParaRPr lang="en-US" dirty="0"/>
           </a:p>
@@ -1257,7 +1273,7 @@
             <a:fld id="{38DD4701-379E-4D60-972F-CC1085113D96}" type="datetimeFigureOut">
               <a:rPr lang="en-US" smtClean="0"/>
               <a:pPr/>
-              <a:t>05-Oct-20</a:t>
+              <a:t>10/19/2020</a:t>
             </a:fld>
             <a:endParaRPr lang="en-US" dirty="0"/>
           </a:p>
@@ -1431,7 +1447,7 @@
           <a:p>
             <a:fld id="{38DD4701-379E-4D60-972F-CC1085113D96}" type="datetimeFigureOut">
               <a:rPr lang="en-US" smtClean="0"/>
-              <a:t>05-Oct-20</a:t>
+              <a:t>10/19/2020</a:t>
             </a:fld>
             <a:endParaRPr lang="en-US" dirty="0"/>
           </a:p>
@@ -1692,7 +1708,7 @@
           <a:p>
             <a:fld id="{38DD4701-379E-4D60-972F-CC1085113D96}" type="datetimeFigureOut">
               <a:rPr lang="en-US" smtClean="0"/>
-              <a:t>05-Oct-20</a:t>
+              <a:t>10/19/2020</a:t>
             </a:fld>
             <a:endParaRPr lang="en-US" dirty="0"/>
           </a:p>
@@ -1921,7 +1937,7 @@
           <a:p>
             <a:fld id="{38DD4701-379E-4D60-972F-CC1085113D96}" type="datetimeFigureOut">
               <a:rPr lang="en-US" smtClean="0"/>
-              <a:t>05-Oct-20</a:t>
+              <a:t>10/19/2020</a:t>
             </a:fld>
             <a:endParaRPr lang="en-US" dirty="0"/>
           </a:p>
@@ -2274,7 +2290,7 @@
           <a:p>
             <a:fld id="{38DD4701-379E-4D60-972F-CC1085113D96}" type="datetimeFigureOut">
               <a:rPr lang="en-US" smtClean="0"/>
-              <a:t>05-Oct-20</a:t>
+              <a:t>10/19/2020</a:t>
             </a:fld>
             <a:endParaRPr lang="en-US" dirty="0"/>
           </a:p>
@@ -2429,7 +2445,7 @@
           <a:p>
             <a:fld id="{38DD4701-379E-4D60-972F-CC1085113D96}" type="datetimeFigureOut">
               <a:rPr lang="en-US" smtClean="0"/>
-              <a:t>05-Oct-20</a:t>
+              <a:t>10/19/2020</a:t>
             </a:fld>
             <a:endParaRPr lang="en-US" dirty="0"/>
           </a:p>
@@ -2720,7 +2736,7 @@
           <a:p>
             <a:fld id="{38DD4701-379E-4D60-972F-CC1085113D96}" type="datetimeFigureOut">
               <a:rPr lang="en-US" smtClean="0"/>
-              <a:t>05-Oct-20</a:t>
+              <a:t>10/19/2020</a:t>
             </a:fld>
             <a:endParaRPr lang="en-US" dirty="0"/>
           </a:p>
@@ -2991,7 +3007,7 @@
           <a:p>
             <a:fld id="{38DD4701-379E-4D60-972F-CC1085113D96}" type="datetimeFigureOut">
               <a:rPr lang="en-US" smtClean="0"/>
-              <a:t>05-Oct-20</a:t>
+              <a:t>10/19/2020</a:t>
             </a:fld>
             <a:endParaRPr lang="en-US" dirty="0"/>
           </a:p>
@@ -3175,7 +3191,7 @@
           <a:p>
             <a:fld id="{38DD4701-379E-4D60-972F-CC1085113D96}" type="datetimeFigureOut">
               <a:rPr lang="en-US" smtClean="0"/>
-              <a:t>05-Oct-20</a:t>
+              <a:t>10/19/2020</a:t>
             </a:fld>
             <a:endParaRPr lang="en-US" dirty="0"/>
           </a:p>
@@ -3352,7 +3368,7 @@
             <a:fld id="{38DD4701-379E-4D60-972F-CC1085113D96}" type="datetimeFigureOut">
               <a:rPr lang="en-US" smtClean="0"/>
               <a:pPr/>
-              <a:t>05-Oct-20</a:t>
+              <a:t>10/19/2020</a:t>
             </a:fld>
             <a:endParaRPr lang="en-US" dirty="0"/>
           </a:p>
@@ -3761,7 +3777,7 @@
           <a:p>
             <a:fld id="{38DD4701-379E-4D60-972F-CC1085113D96}" type="datetimeFigureOut">
               <a:rPr lang="en-US" smtClean="0"/>
-              <a:t>05-Oct-20</a:t>
+              <a:t>10/19/2020</a:t>
             </a:fld>
             <a:endParaRPr lang="en-US" dirty="0"/>
           </a:p>
@@ -3881,7 +3897,7 @@
             <a:fld id="{38DD4701-379E-4D60-972F-CC1085113D96}" type="datetimeFigureOut">
               <a:rPr lang="en-US" smtClean="0"/>
               <a:pPr/>
-              <a:t>05-Oct-20</a:t>
+              <a:t>10/19/2020</a:t>
             </a:fld>
             <a:endParaRPr lang="en-US" dirty="0"/>
           </a:p>
@@ -4132,7 +4148,7 @@
             <a:fld id="{38DD4701-379E-4D60-972F-CC1085113D96}" type="datetimeFigureOut">
               <a:rPr lang="en-US" smtClean="0"/>
               <a:pPr/>
-              <a:t>05-Oct-20</a:t>
+              <a:t>10/19/2020</a:t>
             </a:fld>
             <a:endParaRPr lang="en-US" dirty="0"/>
           </a:p>
@@ -4382,7 +4398,7 @@
             <a:fld id="{38DD4701-379E-4D60-972F-CC1085113D96}" type="datetimeFigureOut">
               <a:rPr lang="en-US" smtClean="0"/>
               <a:pPr/>
-              <a:t>05-Oct-20</a:t>
+              <a:t>10/19/2020</a:t>
             </a:fld>
             <a:endParaRPr lang="en-US" dirty="0"/>
           </a:p>
@@ -4682,7 +4698,7 @@
           <a:p>
             <a:fld id="{38DD4701-379E-4D60-972F-CC1085113D96}" type="datetimeFigureOut">
               <a:rPr lang="en-US" smtClean="0"/>
-              <a:t>05-Oct-20</a:t>
+              <a:t>10/19/2020</a:t>
             </a:fld>
             <a:endParaRPr lang="en-US" dirty="0"/>
           </a:p>
@@ -4829,7 +4845,7 @@
             <a:fld id="{38DD4701-379E-4D60-972F-CC1085113D96}" type="datetimeFigureOut">
               <a:rPr lang="en-US" smtClean="0"/>
               <a:pPr/>
-              <a:t>05-Oct-20</a:t>
+              <a:t>10/19/2020</a:t>
             </a:fld>
             <a:endParaRPr lang="en-US" dirty="0"/>
           </a:p>
@@ -5137,7 +5153,7 @@
             <a:fld id="{38DD4701-379E-4D60-972F-CC1085113D96}" type="datetimeFigureOut">
               <a:rPr lang="en-US" smtClean="0"/>
               <a:pPr/>
-              <a:t>05-Oct-20</a:t>
+              <a:t>10/19/2020</a:t>
             </a:fld>
             <a:endParaRPr lang="en-US" dirty="0"/>
           </a:p>
@@ -5989,7 +6005,7 @@
             <a:fld id="{38DD4701-379E-4D60-972F-CC1085113D96}" type="datetimeFigureOut">
               <a:rPr lang="en-US" smtClean="0"/>
               <a:pPr/>
-              <a:t>05-Oct-20</a:t>
+              <a:t>10/19/2020</a:t>
             </a:fld>
             <a:endParaRPr lang="en-US" dirty="0"/>
           </a:p>
@@ -6257,7 +6273,7 @@
             <a:fld id="{38DD4701-379E-4D60-972F-CC1085113D96}" type="datetimeFigureOut">
               <a:rPr lang="en-US" smtClean="0"/>
               <a:pPr/>
-              <a:t>05-Oct-20</a:t>
+              <a:t>10/19/2020</a:t>
             </a:fld>
             <a:endParaRPr lang="en-US" dirty="0"/>
           </a:p>
@@ -6589,7 +6605,7 @@
             <a:fld id="{38DD4701-379E-4D60-972F-CC1085113D96}" type="datetimeFigureOut">
               <a:rPr lang="en-US" smtClean="0"/>
               <a:pPr/>
-              <a:t>05-Oct-20</a:t>
+              <a:t>10/19/2020</a:t>
             </a:fld>
             <a:endParaRPr lang="en-US" dirty="0"/>
           </a:p>
@@ -7210,28 +7226,61 @@
             <p:ph type="ctrTitle"/>
           </p:nvPr>
         </p:nvSpPr>
-        <p:spPr/>
-        <p:txBody>
-          <a:bodyPr/>
-          <a:lstStyle/>
-          <a:p>
-            <a:endParaRPr lang="en-US" dirty="0"/>
-          </a:p>
-        </p:txBody>
-      </p:sp>
-      <p:sp>
-        <p:nvSpPr>
-          <p:cNvPr id="17" name="Text Placeholder 16"/>
-          <p:cNvSpPr>
-            <a:spLocks noGrp="1"/>
-          </p:cNvSpPr>
-          <p:nvPr>
-            <p:ph type="body" sz="quarter" idx="13"/>
-          </p:nvPr>
-        </p:nvSpPr>
         <p:spPr>
           <a:xfrm>
-            <a:off x="2023621" y="2694091"/>
+            <a:off x="2023621" y="3501110"/>
+            <a:ext cx="8119620" cy="455509"/>
+          </a:xfrm>
+        </p:spPr>
+        <p:txBody>
+          <a:bodyPr/>
+          <a:lstStyle/>
+          <a:p>
+            <a:r>
+              <a:rPr lang="en-US" sz="3200" i="0" dirty="0">
+                <a:solidFill>
+                  <a:srgbClr val="000000"/>
+                </a:solidFill>
+                <a:effectLst/>
+                <a:latin typeface="Roboto" panose="02000000000000000000" pitchFamily="2" charset="0"/>
+                <a:ea typeface="Roboto" panose="02000000000000000000" pitchFamily="2" charset="0"/>
+                <a:cs typeface="Raavi" panose="020B0502040204020203" pitchFamily="34" charset="0"/>
+              </a:rPr>
+              <a:t>Speed and scale tips for </a:t>
+            </a:r>
+            <a:r>
+              <a:rPr lang="en-US" sz="3200" i="0" dirty="0" err="1">
+                <a:solidFill>
+                  <a:srgbClr val="000000"/>
+                </a:solidFill>
+                <a:effectLst/>
+                <a:latin typeface="Roboto" panose="02000000000000000000" pitchFamily="2" charset="0"/>
+                <a:ea typeface="Roboto" panose="02000000000000000000" pitchFamily="2" charset="0"/>
+                <a:cs typeface="Raavi" panose="020B0502040204020203" pitchFamily="34" charset="0"/>
+              </a:rPr>
+              <a:t>PowerCLI</a:t>
+            </a:r>
+            <a:endParaRPr lang="en-US" sz="3200" dirty="0">
+              <a:latin typeface="Roboto" panose="02000000000000000000" pitchFamily="2" charset="0"/>
+              <a:ea typeface="Roboto" panose="02000000000000000000" pitchFamily="2" charset="0"/>
+              <a:cs typeface="Raavi" panose="020B0502040204020203" pitchFamily="34" charset="0"/>
+            </a:endParaRPr>
+          </a:p>
+        </p:txBody>
+      </p:sp>
+      <p:sp>
+        <p:nvSpPr>
+          <p:cNvPr id="17" name="Text Placeholder 16"/>
+          <p:cNvSpPr>
+            <a:spLocks noGrp="1"/>
+          </p:cNvSpPr>
+          <p:nvPr>
+            <p:ph type="body" sz="quarter" idx="13"/>
+          </p:nvPr>
+        </p:nvSpPr>
+        <p:spPr>
+          <a:xfrm>
+            <a:off x="2023621" y="2461126"/>
             <a:ext cx="2039332" cy="230832"/>
           </a:xfrm>
         </p:spPr>
@@ -7256,7 +7305,12 @@
             <p:ph type="body" sz="quarter" idx="14"/>
           </p:nvPr>
         </p:nvSpPr>
-        <p:spPr/>
+        <p:spPr>
+          <a:xfrm>
+            <a:off x="2023621" y="2734129"/>
+            <a:ext cx="2039332" cy="280620"/>
+          </a:xfrm>
+        </p:spPr>
         <p:txBody>
           <a:bodyPr/>
           <a:lstStyle/>
@@ -7265,6 +7319,341 @@
               <a:rPr lang="en-US" dirty="0"/>
               <a:t>23.2020</a:t>
             </a:r>
+          </a:p>
+        </p:txBody>
+      </p:sp>
+      <p:sp>
+        <p:nvSpPr>
+          <p:cNvPr id="5" name="TextBox 5">
+            <a:extLst>
+              <a:ext uri="{FF2B5EF4-FFF2-40B4-BE49-F238E27FC236}">
+                <a16:creationId xmlns:a16="http://schemas.microsoft.com/office/drawing/2014/main" id="{D0896C95-42BF-4D0C-8012-B0161BF604A0}"/>
+              </a:ext>
+            </a:extLst>
+          </p:cNvPr>
+          <p:cNvSpPr txBox="1"/>
+          <p:nvPr/>
+        </p:nvSpPr>
+        <p:spPr>
+          <a:xfrm>
+            <a:off x="2023621" y="4618314"/>
+            <a:ext cx="1545928" cy="369332"/>
+          </a:xfrm>
+          <a:prstGeom prst="rect">
+            <a:avLst/>
+          </a:prstGeom>
+          <a:noFill/>
+        </p:spPr>
+        <p:txBody>
+          <a:bodyPr wrap="square" rtlCol="0">
+            <a:spAutoFit/>
+          </a:bodyPr>
+          <a:lstStyle>
+            <a:defPPr>
+              <a:defRPr lang="en-US"/>
+            </a:defPPr>
+            <a:lvl1pPr marL="0" algn="l" defTabSz="914400" rtl="0" eaLnBrk="1" latinLnBrk="0" hangingPunct="1">
+              <a:defRPr sz="1800" kern="1200">
+                <a:solidFill>
+                  <a:schemeClr val="tx1"/>
+                </a:solidFill>
+                <a:latin typeface="+mn-lt"/>
+                <a:ea typeface="+mn-ea"/>
+                <a:cs typeface="+mn-cs"/>
+              </a:defRPr>
+            </a:lvl1pPr>
+            <a:lvl2pPr marL="457200" algn="l" defTabSz="914400" rtl="0" eaLnBrk="1" latinLnBrk="0" hangingPunct="1">
+              <a:defRPr sz="1800" kern="1200">
+                <a:solidFill>
+                  <a:schemeClr val="tx1"/>
+                </a:solidFill>
+                <a:latin typeface="+mn-lt"/>
+                <a:ea typeface="+mn-ea"/>
+                <a:cs typeface="+mn-cs"/>
+              </a:defRPr>
+            </a:lvl2pPr>
+            <a:lvl3pPr marL="914400" algn="l" defTabSz="914400" rtl="0" eaLnBrk="1" latinLnBrk="0" hangingPunct="1">
+              <a:defRPr sz="1800" kern="1200">
+                <a:solidFill>
+                  <a:schemeClr val="tx1"/>
+                </a:solidFill>
+                <a:latin typeface="+mn-lt"/>
+                <a:ea typeface="+mn-ea"/>
+                <a:cs typeface="+mn-cs"/>
+              </a:defRPr>
+            </a:lvl3pPr>
+            <a:lvl4pPr marL="1371600" algn="l" defTabSz="914400" rtl="0" eaLnBrk="1" latinLnBrk="0" hangingPunct="1">
+              <a:defRPr sz="1800" kern="1200">
+                <a:solidFill>
+                  <a:schemeClr val="tx1"/>
+                </a:solidFill>
+                <a:latin typeface="+mn-lt"/>
+                <a:ea typeface="+mn-ea"/>
+                <a:cs typeface="+mn-cs"/>
+              </a:defRPr>
+            </a:lvl4pPr>
+            <a:lvl5pPr marL="1828800" algn="l" defTabSz="914400" rtl="0" eaLnBrk="1" latinLnBrk="0" hangingPunct="1">
+              <a:defRPr sz="1800" kern="1200">
+                <a:solidFill>
+                  <a:schemeClr val="tx1"/>
+                </a:solidFill>
+                <a:latin typeface="+mn-lt"/>
+                <a:ea typeface="+mn-ea"/>
+                <a:cs typeface="+mn-cs"/>
+              </a:defRPr>
+            </a:lvl5pPr>
+            <a:lvl6pPr marL="2286000" algn="l" defTabSz="914400" rtl="0" eaLnBrk="1" latinLnBrk="0" hangingPunct="1">
+              <a:defRPr sz="1800" kern="1200">
+                <a:solidFill>
+                  <a:schemeClr val="tx1"/>
+                </a:solidFill>
+                <a:latin typeface="+mn-lt"/>
+                <a:ea typeface="+mn-ea"/>
+                <a:cs typeface="+mn-cs"/>
+              </a:defRPr>
+            </a:lvl6pPr>
+            <a:lvl7pPr marL="2743200" algn="l" defTabSz="914400" rtl="0" eaLnBrk="1" latinLnBrk="0" hangingPunct="1">
+              <a:defRPr sz="1800" kern="1200">
+                <a:solidFill>
+                  <a:schemeClr val="tx1"/>
+                </a:solidFill>
+                <a:latin typeface="+mn-lt"/>
+                <a:ea typeface="+mn-ea"/>
+                <a:cs typeface="+mn-cs"/>
+              </a:defRPr>
+            </a:lvl7pPr>
+            <a:lvl8pPr marL="3200400" algn="l" defTabSz="914400" rtl="0" eaLnBrk="1" latinLnBrk="0" hangingPunct="1">
+              <a:defRPr sz="1800" kern="1200">
+                <a:solidFill>
+                  <a:schemeClr val="tx1"/>
+                </a:solidFill>
+                <a:latin typeface="+mn-lt"/>
+                <a:ea typeface="+mn-ea"/>
+                <a:cs typeface="+mn-cs"/>
+              </a:defRPr>
+            </a:lvl8pPr>
+            <a:lvl9pPr marL="3657600" algn="l" defTabSz="914400" rtl="0" eaLnBrk="1" latinLnBrk="0" hangingPunct="1">
+              <a:defRPr sz="1800" kern="1200">
+                <a:solidFill>
+                  <a:schemeClr val="tx1"/>
+                </a:solidFill>
+                <a:latin typeface="+mn-lt"/>
+                <a:ea typeface="+mn-ea"/>
+                <a:cs typeface="+mn-cs"/>
+              </a:defRPr>
+            </a:lvl9pPr>
+          </a:lstStyle>
+          <a:p>
+            <a:pPr marL="0" marR="0" lvl="0" indent="0" defTabSz="914400" eaLnBrk="1" fontAlgn="auto" latinLnBrk="0" hangingPunct="1">
+              <a:lnSpc>
+                <a:spcPct val="100000"/>
+              </a:lnSpc>
+              <a:spcBef>
+                <a:spcPts val="0"/>
+              </a:spcBef>
+              <a:spcAft>
+                <a:spcPts val="0"/>
+              </a:spcAft>
+              <a:buClrTx/>
+              <a:buSzTx/>
+              <a:buFontTx/>
+              <a:buNone/>
+              <a:tabLst/>
+              <a:defRPr/>
+            </a:pPr>
+            <a:r>
+              <a:rPr kumimoji="0" lang="en-US" sz="1800" b="0" i="0" u="none" strike="noStrike" kern="0" cap="none" spc="0" normalizeH="0" baseline="0" noProof="0" dirty="0">
+                <a:ln>
+                  <a:noFill/>
+                </a:ln>
+                <a:solidFill>
+                  <a:srgbClr val="0C4360">
+                    <a:lumMod val="20000"/>
+                    <a:lumOff val="80000"/>
+                  </a:srgbClr>
+                </a:solidFill>
+                <a:effectLst/>
+                <a:uLnTx/>
+                <a:uFillTx/>
+              </a:rPr>
+              <a:t>Luc Dekens</a:t>
+            </a:r>
+          </a:p>
+        </p:txBody>
+      </p:sp>
+      <p:sp>
+        <p:nvSpPr>
+          <p:cNvPr id="6" name="TextBox 6">
+            <a:extLst>
+              <a:ext uri="{FF2B5EF4-FFF2-40B4-BE49-F238E27FC236}">
+                <a16:creationId xmlns:a16="http://schemas.microsoft.com/office/drawing/2014/main" id="{E8E6FE15-3A73-4122-B2CE-773D96B973C8}"/>
+              </a:ext>
+            </a:extLst>
+          </p:cNvPr>
+          <p:cNvSpPr txBox="1"/>
+          <p:nvPr/>
+        </p:nvSpPr>
+        <p:spPr>
+          <a:xfrm>
+            <a:off x="7465511" y="2576542"/>
+            <a:ext cx="1327075" cy="369332"/>
+          </a:xfrm>
+          <a:prstGeom prst="rect">
+            <a:avLst/>
+          </a:prstGeom>
+          <a:noFill/>
+        </p:spPr>
+        <p:txBody>
+          <a:bodyPr wrap="square" rtlCol="0">
+            <a:spAutoFit/>
+          </a:bodyPr>
+          <a:lstStyle>
+            <a:defPPr>
+              <a:defRPr lang="en-US"/>
+            </a:defPPr>
+            <a:lvl1pPr marL="0" algn="l" defTabSz="914400" rtl="0" eaLnBrk="1" latinLnBrk="0" hangingPunct="1">
+              <a:defRPr sz="1800" kern="1200">
+                <a:solidFill>
+                  <a:schemeClr val="tx1"/>
+                </a:solidFill>
+                <a:latin typeface="+mn-lt"/>
+                <a:ea typeface="+mn-ea"/>
+                <a:cs typeface="+mn-cs"/>
+              </a:defRPr>
+            </a:lvl1pPr>
+            <a:lvl2pPr marL="457200" algn="l" defTabSz="914400" rtl="0" eaLnBrk="1" latinLnBrk="0" hangingPunct="1">
+              <a:defRPr sz="1800" kern="1200">
+                <a:solidFill>
+                  <a:schemeClr val="tx1"/>
+                </a:solidFill>
+                <a:latin typeface="+mn-lt"/>
+                <a:ea typeface="+mn-ea"/>
+                <a:cs typeface="+mn-cs"/>
+              </a:defRPr>
+            </a:lvl2pPr>
+            <a:lvl3pPr marL="914400" algn="l" defTabSz="914400" rtl="0" eaLnBrk="1" latinLnBrk="0" hangingPunct="1">
+              <a:defRPr sz="1800" kern="1200">
+                <a:solidFill>
+                  <a:schemeClr val="tx1"/>
+                </a:solidFill>
+                <a:latin typeface="+mn-lt"/>
+                <a:ea typeface="+mn-ea"/>
+                <a:cs typeface="+mn-cs"/>
+              </a:defRPr>
+            </a:lvl3pPr>
+            <a:lvl4pPr marL="1371600" algn="l" defTabSz="914400" rtl="0" eaLnBrk="1" latinLnBrk="0" hangingPunct="1">
+              <a:defRPr sz="1800" kern="1200">
+                <a:solidFill>
+                  <a:schemeClr val="tx1"/>
+                </a:solidFill>
+                <a:latin typeface="+mn-lt"/>
+                <a:ea typeface="+mn-ea"/>
+                <a:cs typeface="+mn-cs"/>
+              </a:defRPr>
+            </a:lvl4pPr>
+            <a:lvl5pPr marL="1828800" algn="l" defTabSz="914400" rtl="0" eaLnBrk="1" latinLnBrk="0" hangingPunct="1">
+              <a:defRPr sz="1800" kern="1200">
+                <a:solidFill>
+                  <a:schemeClr val="tx1"/>
+                </a:solidFill>
+                <a:latin typeface="+mn-lt"/>
+                <a:ea typeface="+mn-ea"/>
+                <a:cs typeface="+mn-cs"/>
+              </a:defRPr>
+            </a:lvl5pPr>
+            <a:lvl6pPr marL="2286000" algn="l" defTabSz="914400" rtl="0" eaLnBrk="1" latinLnBrk="0" hangingPunct="1">
+              <a:defRPr sz="1800" kern="1200">
+                <a:solidFill>
+                  <a:schemeClr val="tx1"/>
+                </a:solidFill>
+                <a:latin typeface="+mn-lt"/>
+                <a:ea typeface="+mn-ea"/>
+                <a:cs typeface="+mn-cs"/>
+              </a:defRPr>
+            </a:lvl6pPr>
+            <a:lvl7pPr marL="2743200" algn="l" defTabSz="914400" rtl="0" eaLnBrk="1" latinLnBrk="0" hangingPunct="1">
+              <a:defRPr sz="1800" kern="1200">
+                <a:solidFill>
+                  <a:schemeClr val="tx1"/>
+                </a:solidFill>
+                <a:latin typeface="+mn-lt"/>
+                <a:ea typeface="+mn-ea"/>
+                <a:cs typeface="+mn-cs"/>
+              </a:defRPr>
+            </a:lvl7pPr>
+            <a:lvl8pPr marL="3200400" algn="l" defTabSz="914400" rtl="0" eaLnBrk="1" latinLnBrk="0" hangingPunct="1">
+              <a:defRPr sz="1800" kern="1200">
+                <a:solidFill>
+                  <a:schemeClr val="tx1"/>
+                </a:solidFill>
+                <a:latin typeface="+mn-lt"/>
+                <a:ea typeface="+mn-ea"/>
+                <a:cs typeface="+mn-cs"/>
+              </a:defRPr>
+            </a:lvl8pPr>
+            <a:lvl9pPr marL="3657600" algn="l" defTabSz="914400" rtl="0" eaLnBrk="1" latinLnBrk="0" hangingPunct="1">
+              <a:defRPr sz="1800" kern="1200">
+                <a:solidFill>
+                  <a:schemeClr val="tx1"/>
+                </a:solidFill>
+                <a:latin typeface="+mn-lt"/>
+                <a:ea typeface="+mn-ea"/>
+                <a:cs typeface="+mn-cs"/>
+              </a:defRPr>
+            </a:lvl9pPr>
+          </a:lstStyle>
+          <a:p>
+            <a:pPr marL="0" marR="0" lvl="0" indent="0" defTabSz="914400" eaLnBrk="1" fontAlgn="auto" latinLnBrk="0" hangingPunct="1">
+              <a:lnSpc>
+                <a:spcPct val="100000"/>
+              </a:lnSpc>
+              <a:spcBef>
+                <a:spcPts val="0"/>
+              </a:spcBef>
+              <a:spcAft>
+                <a:spcPts val="0"/>
+              </a:spcAft>
+              <a:buClrTx/>
+              <a:buSzTx/>
+              <a:buFontTx/>
+              <a:buNone/>
+              <a:tabLst/>
+              <a:defRPr/>
+            </a:pPr>
+            <a:r>
+              <a:rPr kumimoji="0" lang="en-US" sz="1800" b="0" i="0" u="none" strike="noStrike" kern="0" cap="none" spc="0" normalizeH="0" baseline="0" noProof="0" dirty="0">
+                <a:ln>
+                  <a:noFill/>
+                </a:ln>
+                <a:solidFill>
+                  <a:srgbClr val="0C4360">
+                    <a:lumMod val="20000"/>
+                    <a:lumOff val="80000"/>
+                  </a:srgbClr>
+                </a:solidFill>
+                <a:effectLst/>
+                <a:uLnTx/>
+                <a:uFillTx/>
+                <a:latin typeface="Calibri" panose="020F0502020204030204" pitchFamily="34" charset="0"/>
+                <a:ea typeface="Calibri" panose="020F0502020204030204" pitchFamily="34" charset="0"/>
+                <a:cs typeface="Times New Roman" panose="02020603050405020304" pitchFamily="18" charset="0"/>
+              </a:rPr>
+              <a:t> VMUGBE+</a:t>
+            </a:r>
+            <a:endParaRPr kumimoji="0" lang="en-US" sz="1800" b="0" i="0" u="none" strike="noStrike" kern="0" cap="none" spc="0" normalizeH="0" baseline="0" noProof="0" dirty="0">
+              <a:ln>
+                <a:noFill/>
+              </a:ln>
+              <a:solidFill>
+                <a:srgbClr val="0C4360">
+                  <a:lumMod val="20000"/>
+                  <a:lumOff val="80000"/>
+                </a:srgbClr>
+              </a:solidFill>
+              <a:effectLst/>
+              <a:uLnTx/>
+              <a:uFillTx/>
+            </a:endParaRPr>
           </a:p>
         </p:txBody>
       </p:sp>
@@ -7272,6 +7661,1179 @@
     <p:extLst>
       <p:ext uri="{BB962C8B-B14F-4D97-AF65-F5344CB8AC3E}">
         <p14:creationId xmlns:p14="http://schemas.microsoft.com/office/powerpoint/2010/main" val="140654529"/>
+      </p:ext>
+    </p:extLst>
+  </p:cSld>
+  <p:clrMapOvr>
+    <a:masterClrMapping/>
+  </p:clrMapOvr>
+</p:sld>
+</file>
+
+<file path=ppt/slides/slide10.xml><?xml version="1.0" encoding="utf-8"?>
+<p:sld xmlns:a="http://schemas.openxmlformats.org/drawingml/2006/main" xmlns:r="http://schemas.openxmlformats.org/officeDocument/2006/relationships" xmlns:p="http://schemas.openxmlformats.org/presentationml/2006/main">
+  <p:cSld>
+    <p:spTree>
+      <p:nvGrpSpPr>
+        <p:cNvPr id="1" name=""/>
+        <p:cNvGrpSpPr/>
+        <p:nvPr/>
+      </p:nvGrpSpPr>
+      <p:grpSpPr>
+        <a:xfrm>
+          <a:off x="0" y="0"/>
+          <a:ext cx="0" cy="0"/>
+          <a:chOff x="0" y="0"/>
+          <a:chExt cx="0" cy="0"/>
+        </a:xfrm>
+      </p:grpSpPr>
+      <p:sp>
+        <p:nvSpPr>
+          <p:cNvPr id="2" name="Title 1"/>
+          <p:cNvSpPr>
+            <a:spLocks noGrp="1"/>
+          </p:cNvSpPr>
+          <p:nvPr>
+            <p:ph type="title"/>
+          </p:nvPr>
+        </p:nvSpPr>
+        <p:spPr>
+          <a:xfrm>
+            <a:off x="4675695" y="3879568"/>
+            <a:ext cx="6202837" cy="1800493"/>
+          </a:xfrm>
+        </p:spPr>
+        <p:txBody>
+          <a:bodyPr/>
+          <a:lstStyle/>
+          <a:p>
+            <a:r>
+              <a:rPr lang="en-US" dirty="0"/>
+              <a:t>Cmdlets &amp; Modules</a:t>
+            </a:r>
+          </a:p>
+        </p:txBody>
+      </p:sp>
+      <p:sp>
+        <p:nvSpPr>
+          <p:cNvPr id="3" name="Text Placeholder 2"/>
+          <p:cNvSpPr>
+            <a:spLocks noGrp="1"/>
+          </p:cNvSpPr>
+          <p:nvPr>
+            <p:ph type="body" sz="quarter" idx="13"/>
+          </p:nvPr>
+        </p:nvSpPr>
+        <p:spPr>
+          <a:xfrm>
+            <a:off x="1185737" y="4891285"/>
+            <a:ext cx="2063750" cy="1384995"/>
+          </a:xfrm>
+        </p:spPr>
+        <p:txBody>
+          <a:bodyPr/>
+          <a:lstStyle/>
+          <a:p>
+            <a:r>
+              <a:rPr lang="en-US" dirty="0"/>
+              <a:t>3</a:t>
+            </a:r>
+          </a:p>
+        </p:txBody>
+      </p:sp>
+    </p:spTree>
+    <p:extLst>
+      <p:ext uri="{BB962C8B-B14F-4D97-AF65-F5344CB8AC3E}">
+        <p14:creationId xmlns:p14="http://schemas.microsoft.com/office/powerpoint/2010/main" val="3649156160"/>
+      </p:ext>
+    </p:extLst>
+  </p:cSld>
+  <p:clrMapOvr>
+    <a:masterClrMapping/>
+  </p:clrMapOvr>
+</p:sld>
+</file>
+
+<file path=ppt/slides/slide11.xml><?xml version="1.0" encoding="utf-8"?>
+<p:sld xmlns:a="http://schemas.openxmlformats.org/drawingml/2006/main" xmlns:r="http://schemas.openxmlformats.org/officeDocument/2006/relationships" xmlns:p="http://schemas.openxmlformats.org/presentationml/2006/main">
+  <p:cSld>
+    <p:spTree>
+      <p:nvGrpSpPr>
+        <p:cNvPr id="1" name=""/>
+        <p:cNvGrpSpPr/>
+        <p:nvPr/>
+      </p:nvGrpSpPr>
+      <p:grpSpPr>
+        <a:xfrm>
+          <a:off x="0" y="0"/>
+          <a:ext cx="0" cy="0"/>
+          <a:chOff x="0" y="0"/>
+          <a:chExt cx="0" cy="0"/>
+        </a:xfrm>
+      </p:grpSpPr>
+      <p:sp>
+        <p:nvSpPr>
+          <p:cNvPr id="2" name="Title 1"/>
+          <p:cNvSpPr>
+            <a:spLocks noGrp="1"/>
+          </p:cNvSpPr>
+          <p:nvPr>
+            <p:ph type="title"/>
+          </p:nvPr>
+        </p:nvSpPr>
+        <p:spPr/>
+        <p:txBody>
+          <a:bodyPr/>
+          <a:lstStyle/>
+          <a:p>
+            <a:r>
+              <a:rPr lang="en-US" dirty="0"/>
+              <a:t>Cmdlets &amp; Modules</a:t>
+            </a:r>
+          </a:p>
+        </p:txBody>
+      </p:sp>
+      <p:sp>
+        <p:nvSpPr>
+          <p:cNvPr id="4" name="TextBox 3">
+            <a:extLst>
+              <a:ext uri="{FF2B5EF4-FFF2-40B4-BE49-F238E27FC236}">
+                <a16:creationId xmlns:a16="http://schemas.microsoft.com/office/drawing/2014/main" id="{94A672BB-C2FA-4E8A-93DF-F999A9F20106}"/>
+              </a:ext>
+            </a:extLst>
+          </p:cNvPr>
+          <p:cNvSpPr txBox="1"/>
+          <p:nvPr/>
+        </p:nvSpPr>
+        <p:spPr bwMode="gray">
+          <a:xfrm>
+            <a:off x="1836000" y="1260000"/>
+            <a:ext cx="6897600" cy="4713534"/>
+          </a:xfrm>
+          <a:prstGeom prst="rect">
+            <a:avLst/>
+          </a:prstGeom>
+          <a:noFill/>
+        </p:spPr>
+        <p:txBody>
+          <a:bodyPr wrap="square" lIns="0" tIns="0" rIns="0" bIns="0" rtlCol="0">
+            <a:spAutoFit/>
+          </a:bodyPr>
+          <a:lstStyle/>
+          <a:p>
+            <a:pPr marL="285750" indent="-285750">
+              <a:lnSpc>
+                <a:spcPct val="150000"/>
+              </a:lnSpc>
+              <a:spcBef>
+                <a:spcPts val="600"/>
+              </a:spcBef>
+              <a:buFont typeface="Arial" panose="020B0604020202020204" pitchFamily="34" charset="0"/>
+              <a:buChar char="•"/>
+            </a:pPr>
+            <a:r>
+              <a:rPr lang="en-US" sz="2000" dirty="0">
+                <a:solidFill>
+                  <a:schemeClr val="tx1"/>
+                </a:solidFill>
+              </a:rPr>
+              <a:t>Don’t reinvent the wheel</a:t>
+            </a:r>
+          </a:p>
+          <a:p>
+            <a:pPr marL="285750" indent="-285750">
+              <a:lnSpc>
+                <a:spcPct val="150000"/>
+              </a:lnSpc>
+              <a:spcBef>
+                <a:spcPts val="600"/>
+              </a:spcBef>
+              <a:buFont typeface="Arial" panose="020B0604020202020204" pitchFamily="34" charset="0"/>
+              <a:buChar char="•"/>
+            </a:pPr>
+            <a:r>
+              <a:rPr lang="en-US" sz="2000" dirty="0"/>
+              <a:t>Cmdlets</a:t>
+            </a:r>
+          </a:p>
+          <a:p>
+            <a:pPr marL="742950" lvl="1" indent="-285750">
+              <a:lnSpc>
+                <a:spcPct val="150000"/>
+              </a:lnSpc>
+              <a:spcBef>
+                <a:spcPts val="600"/>
+              </a:spcBef>
+              <a:buFont typeface="Arial" panose="020B0604020202020204" pitchFamily="34" charset="0"/>
+              <a:buChar char="•"/>
+            </a:pPr>
+            <a:r>
+              <a:rPr lang="en-US" sz="2000" dirty="0">
+                <a:solidFill>
+                  <a:schemeClr val="tx1"/>
+                </a:solidFill>
+              </a:rPr>
+              <a:t>Measure-Object</a:t>
+            </a:r>
+          </a:p>
+          <a:p>
+            <a:pPr marL="742950" lvl="1" indent="-285750">
+              <a:lnSpc>
+                <a:spcPct val="150000"/>
+              </a:lnSpc>
+              <a:spcBef>
+                <a:spcPts val="600"/>
+              </a:spcBef>
+              <a:buFont typeface="Arial" panose="020B0604020202020204" pitchFamily="34" charset="0"/>
+              <a:buChar char="•"/>
+            </a:pPr>
+            <a:r>
+              <a:rPr lang="en-US" sz="2000" dirty="0"/>
+              <a:t>Group-Object</a:t>
+            </a:r>
+          </a:p>
+          <a:p>
+            <a:pPr marL="742950" lvl="1" indent="-285750">
+              <a:lnSpc>
+                <a:spcPct val="150000"/>
+              </a:lnSpc>
+              <a:spcBef>
+                <a:spcPts val="600"/>
+              </a:spcBef>
+              <a:buFont typeface="Arial" panose="020B0604020202020204" pitchFamily="34" charset="0"/>
+              <a:buChar char="•"/>
+            </a:pPr>
+            <a:r>
+              <a:rPr lang="en-US" sz="2000" dirty="0">
+                <a:solidFill>
+                  <a:schemeClr val="tx1"/>
+                </a:solidFill>
+              </a:rPr>
+              <a:t>Sort-Object</a:t>
+            </a:r>
+          </a:p>
+          <a:p>
+            <a:pPr marL="742950" lvl="1" indent="-285750">
+              <a:lnSpc>
+                <a:spcPct val="150000"/>
+              </a:lnSpc>
+              <a:spcBef>
+                <a:spcPts val="600"/>
+              </a:spcBef>
+              <a:buFont typeface="Arial" panose="020B0604020202020204" pitchFamily="34" charset="0"/>
+              <a:buChar char="•"/>
+            </a:pPr>
+            <a:r>
+              <a:rPr lang="en-US" sz="2000" dirty="0"/>
+              <a:t>… and a cast of 1000s</a:t>
+            </a:r>
+            <a:endParaRPr lang="en-US" sz="2000" dirty="0">
+              <a:solidFill>
+                <a:schemeClr val="tx1"/>
+              </a:solidFill>
+            </a:endParaRPr>
+          </a:p>
+          <a:p>
+            <a:pPr marL="285750" indent="-285750">
+              <a:lnSpc>
+                <a:spcPct val="150000"/>
+              </a:lnSpc>
+              <a:spcBef>
+                <a:spcPts val="600"/>
+              </a:spcBef>
+              <a:buFont typeface="Arial" panose="020B0604020202020204" pitchFamily="34" charset="0"/>
+              <a:buChar char="•"/>
+            </a:pPr>
+            <a:r>
+              <a:rPr lang="en-US" sz="2000" dirty="0"/>
+              <a:t>Modules</a:t>
+            </a:r>
+          </a:p>
+          <a:p>
+            <a:pPr marL="742950" lvl="1" indent="-285750">
+              <a:lnSpc>
+                <a:spcPct val="150000"/>
+              </a:lnSpc>
+              <a:spcBef>
+                <a:spcPts val="600"/>
+              </a:spcBef>
+              <a:buFont typeface="Arial" panose="020B0604020202020204" pitchFamily="34" charset="0"/>
+              <a:buChar char="•"/>
+            </a:pPr>
+            <a:r>
+              <a:rPr lang="en-US" sz="2000" dirty="0" err="1">
+                <a:solidFill>
+                  <a:schemeClr val="tx1"/>
+                </a:solidFill>
+              </a:rPr>
+              <a:t>ImportExcel</a:t>
+            </a:r>
+            <a:endParaRPr lang="en-US" sz="2000" dirty="0">
+              <a:solidFill>
+                <a:schemeClr val="tx1"/>
+              </a:solidFill>
+            </a:endParaRPr>
+          </a:p>
+          <a:p>
+            <a:pPr marL="742950" lvl="1" indent="-285750">
+              <a:lnSpc>
+                <a:spcPct val="150000"/>
+              </a:lnSpc>
+              <a:spcBef>
+                <a:spcPts val="600"/>
+              </a:spcBef>
+              <a:buFont typeface="Arial" panose="020B0604020202020204" pitchFamily="34" charset="0"/>
+              <a:buChar char="•"/>
+            </a:pPr>
+            <a:r>
+              <a:rPr lang="en-US" sz="2000" dirty="0"/>
+              <a:t>… and many more</a:t>
+            </a:r>
+            <a:endParaRPr lang="en-US" sz="2000" dirty="0">
+              <a:solidFill>
+                <a:schemeClr val="tx1"/>
+              </a:solidFill>
+            </a:endParaRPr>
+          </a:p>
+        </p:txBody>
+      </p:sp>
+    </p:spTree>
+    <p:extLst>
+      <p:ext uri="{BB962C8B-B14F-4D97-AF65-F5344CB8AC3E}">
+        <p14:creationId xmlns:p14="http://schemas.microsoft.com/office/powerpoint/2010/main" val="2138240680"/>
+      </p:ext>
+    </p:extLst>
+  </p:cSld>
+  <p:clrMapOvr>
+    <a:masterClrMapping/>
+  </p:clrMapOvr>
+</p:sld>
+</file>
+
+<file path=ppt/slides/slide12.xml><?xml version="1.0" encoding="utf-8"?>
+<p:sld xmlns:a="http://schemas.openxmlformats.org/drawingml/2006/main" xmlns:r="http://schemas.openxmlformats.org/officeDocument/2006/relationships" xmlns:p="http://schemas.openxmlformats.org/presentationml/2006/main">
+  <p:cSld>
+    <p:spTree>
+      <p:nvGrpSpPr>
+        <p:cNvPr id="1" name=""/>
+        <p:cNvGrpSpPr/>
+        <p:nvPr/>
+      </p:nvGrpSpPr>
+      <p:grpSpPr>
+        <a:xfrm>
+          <a:off x="0" y="0"/>
+          <a:ext cx="0" cy="0"/>
+          <a:chOff x="0" y="0"/>
+          <a:chExt cx="0" cy="0"/>
+        </a:xfrm>
+      </p:grpSpPr>
+      <p:pic>
+        <p:nvPicPr>
+          <p:cNvPr id="3074" name="Picture 2" descr="PHEW FINALLY IT'S DEMO TIME Makeamemeorg PHEW FINALLY IT'S DEMO TIME -  Happy Squirrel | Make a Meme | Meme on ME.ME">
+            <a:extLst>
+              <a:ext uri="{FF2B5EF4-FFF2-40B4-BE49-F238E27FC236}">
+                <a16:creationId xmlns:a16="http://schemas.microsoft.com/office/drawing/2014/main" id="{6891C675-558E-4238-ADF7-568298970A10}"/>
+              </a:ext>
+            </a:extLst>
+          </p:cNvPr>
+          <p:cNvPicPr>
+            <a:picLocks noChangeAspect="1" noChangeArrowheads="1"/>
+          </p:cNvPicPr>
+          <p:nvPr/>
+        </p:nvPicPr>
+        <p:blipFill>
+          <a:blip r:embed="rId2">
+            <a:extLst>
+              <a:ext uri="{28A0092B-C50C-407E-A947-70E740481C1C}">
+                <a14:useLocalDpi xmlns:a14="http://schemas.microsoft.com/office/drawing/2010/main" val="0"/>
+              </a:ext>
+            </a:extLst>
+          </a:blip>
+          <a:srcRect/>
+          <a:stretch>
+            <a:fillRect/>
+          </a:stretch>
+        </p:blipFill>
+        <p:spPr bwMode="auto">
+          <a:xfrm>
+            <a:off x="4149225" y="733840"/>
+            <a:ext cx="3893550" cy="4996723"/>
+          </a:xfrm>
+          <a:prstGeom prst="rect">
+            <a:avLst/>
+          </a:prstGeom>
+          <a:noFill/>
+          <a:extLst>
+            <a:ext uri="{909E8E84-426E-40DD-AFC4-6F175D3DCCD1}">
+              <a14:hiddenFill xmlns:a14="http://schemas.microsoft.com/office/drawing/2010/main">
+                <a:solidFill>
+                  <a:srgbClr val="FFFFFF"/>
+                </a:solidFill>
+              </a14:hiddenFill>
+            </a:ext>
+          </a:extLst>
+        </p:spPr>
+      </p:pic>
+    </p:spTree>
+    <p:extLst>
+      <p:ext uri="{BB962C8B-B14F-4D97-AF65-F5344CB8AC3E}">
+        <p14:creationId xmlns:p14="http://schemas.microsoft.com/office/powerpoint/2010/main" val="425599317"/>
+      </p:ext>
+    </p:extLst>
+  </p:cSld>
+  <p:clrMapOvr>
+    <a:masterClrMapping/>
+  </p:clrMapOvr>
+</p:sld>
+</file>
+
+<file path=ppt/slides/slide13.xml><?xml version="1.0" encoding="utf-8"?>
+<p:sld xmlns:a="http://schemas.openxmlformats.org/drawingml/2006/main" xmlns:r="http://schemas.openxmlformats.org/officeDocument/2006/relationships" xmlns:p="http://schemas.openxmlformats.org/presentationml/2006/main">
+  <p:cSld>
+    <p:spTree>
+      <p:nvGrpSpPr>
+        <p:cNvPr id="1" name=""/>
+        <p:cNvGrpSpPr/>
+        <p:nvPr/>
+      </p:nvGrpSpPr>
+      <p:grpSpPr>
+        <a:xfrm>
+          <a:off x="0" y="0"/>
+          <a:ext cx="0" cy="0"/>
+          <a:chOff x="0" y="0"/>
+          <a:chExt cx="0" cy="0"/>
+        </a:xfrm>
+      </p:grpSpPr>
+      <p:sp>
+        <p:nvSpPr>
+          <p:cNvPr id="2" name="Title 1"/>
+          <p:cNvSpPr>
+            <a:spLocks noGrp="1"/>
+          </p:cNvSpPr>
+          <p:nvPr>
+            <p:ph type="title"/>
+          </p:nvPr>
+        </p:nvSpPr>
+        <p:spPr>
+          <a:xfrm>
+            <a:off x="4675695" y="3879568"/>
+            <a:ext cx="6202837" cy="900246"/>
+          </a:xfrm>
+        </p:spPr>
+        <p:txBody>
+          <a:bodyPr/>
+          <a:lstStyle/>
+          <a:p>
+            <a:r>
+              <a:rPr lang="en-US" dirty="0"/>
+              <a:t>Digging Deep</a:t>
+            </a:r>
+          </a:p>
+        </p:txBody>
+      </p:sp>
+      <p:sp>
+        <p:nvSpPr>
+          <p:cNvPr id="3" name="Text Placeholder 2"/>
+          <p:cNvSpPr>
+            <a:spLocks noGrp="1"/>
+          </p:cNvSpPr>
+          <p:nvPr>
+            <p:ph type="body" sz="quarter" idx="13"/>
+          </p:nvPr>
+        </p:nvSpPr>
+        <p:spPr>
+          <a:xfrm>
+            <a:off x="1185737" y="4891285"/>
+            <a:ext cx="2063750" cy="1384995"/>
+          </a:xfrm>
+        </p:spPr>
+        <p:txBody>
+          <a:bodyPr/>
+          <a:lstStyle/>
+          <a:p>
+            <a:r>
+              <a:rPr lang="en-US" dirty="0"/>
+              <a:t>4</a:t>
+            </a:r>
+          </a:p>
+        </p:txBody>
+      </p:sp>
+    </p:spTree>
+    <p:extLst>
+      <p:ext uri="{BB962C8B-B14F-4D97-AF65-F5344CB8AC3E}">
+        <p14:creationId xmlns:p14="http://schemas.microsoft.com/office/powerpoint/2010/main" val="1886896193"/>
+      </p:ext>
+    </p:extLst>
+  </p:cSld>
+  <p:clrMapOvr>
+    <a:masterClrMapping/>
+  </p:clrMapOvr>
+</p:sld>
+</file>
+
+<file path=ppt/slides/slide14.xml><?xml version="1.0" encoding="utf-8"?>
+<p:sld xmlns:a="http://schemas.openxmlformats.org/drawingml/2006/main" xmlns:r="http://schemas.openxmlformats.org/officeDocument/2006/relationships" xmlns:p="http://schemas.openxmlformats.org/presentationml/2006/main">
+  <p:cSld>
+    <p:spTree>
+      <p:nvGrpSpPr>
+        <p:cNvPr id="1" name=""/>
+        <p:cNvGrpSpPr/>
+        <p:nvPr/>
+      </p:nvGrpSpPr>
+      <p:grpSpPr>
+        <a:xfrm>
+          <a:off x="0" y="0"/>
+          <a:ext cx="0" cy="0"/>
+          <a:chOff x="0" y="0"/>
+          <a:chExt cx="0" cy="0"/>
+        </a:xfrm>
+      </p:grpSpPr>
+      <p:sp>
+        <p:nvSpPr>
+          <p:cNvPr id="2" name="Title 1"/>
+          <p:cNvSpPr>
+            <a:spLocks noGrp="1"/>
+          </p:cNvSpPr>
+          <p:nvPr>
+            <p:ph type="title"/>
+          </p:nvPr>
+        </p:nvSpPr>
+        <p:spPr/>
+        <p:txBody>
+          <a:bodyPr/>
+          <a:lstStyle/>
+          <a:p>
+            <a:r>
+              <a:rPr lang="en-US" dirty="0"/>
+              <a:t>Methods &amp; Properties</a:t>
+            </a:r>
+          </a:p>
+        </p:txBody>
+      </p:sp>
+      <p:sp>
+        <p:nvSpPr>
+          <p:cNvPr id="4" name="TextBox 3">
+            <a:extLst>
+              <a:ext uri="{FF2B5EF4-FFF2-40B4-BE49-F238E27FC236}">
+                <a16:creationId xmlns:a16="http://schemas.microsoft.com/office/drawing/2014/main" id="{DAEEF28F-312F-4DD2-88EE-8396CFE7C0B8}"/>
+              </a:ext>
+            </a:extLst>
+          </p:cNvPr>
+          <p:cNvSpPr txBox="1"/>
+          <p:nvPr/>
+        </p:nvSpPr>
+        <p:spPr bwMode="gray">
+          <a:xfrm>
+            <a:off x="2030400" y="1737278"/>
+            <a:ext cx="7977600" cy="2559099"/>
+          </a:xfrm>
+          <a:prstGeom prst="rect">
+            <a:avLst/>
+          </a:prstGeom>
+          <a:noFill/>
+        </p:spPr>
+        <p:txBody>
+          <a:bodyPr wrap="square" lIns="0" tIns="0" rIns="0" bIns="0" rtlCol="0">
+            <a:spAutoFit/>
+          </a:bodyPr>
+          <a:lstStyle/>
+          <a:p>
+            <a:pPr marL="285750" indent="-285750">
+              <a:lnSpc>
+                <a:spcPct val="150000"/>
+              </a:lnSpc>
+              <a:spcBef>
+                <a:spcPts val="600"/>
+              </a:spcBef>
+              <a:buFont typeface="Arial" panose="020B0604020202020204" pitchFamily="34" charset="0"/>
+              <a:buChar char="•"/>
+            </a:pPr>
+            <a:r>
+              <a:rPr lang="en-US" sz="2000" dirty="0"/>
+              <a:t>A word on objects</a:t>
+            </a:r>
+          </a:p>
+          <a:p>
+            <a:pPr marL="742950" lvl="1" indent="-285750">
+              <a:lnSpc>
+                <a:spcPct val="150000"/>
+              </a:lnSpc>
+              <a:spcBef>
+                <a:spcPts val="600"/>
+              </a:spcBef>
+              <a:buFont typeface="Arial" panose="020B0604020202020204" pitchFamily="34" charset="0"/>
+              <a:buChar char="•"/>
+            </a:pPr>
+            <a:r>
+              <a:rPr lang="en-US" sz="2000" dirty="0">
+                <a:solidFill>
+                  <a:schemeClr val="tx1"/>
+                </a:solidFill>
+              </a:rPr>
+              <a:t>.NET objects</a:t>
+            </a:r>
+          </a:p>
+          <a:p>
+            <a:pPr marL="742950" lvl="1" indent="-285750">
+              <a:lnSpc>
+                <a:spcPct val="150000"/>
+              </a:lnSpc>
+              <a:spcBef>
+                <a:spcPts val="600"/>
+              </a:spcBef>
+              <a:buFont typeface="Arial" panose="020B0604020202020204" pitchFamily="34" charset="0"/>
+              <a:buChar char="•"/>
+            </a:pPr>
+            <a:r>
+              <a:rPr lang="en-US" sz="2000" dirty="0"/>
+              <a:t>vSphere objects</a:t>
+            </a:r>
+          </a:p>
+          <a:p>
+            <a:pPr marL="285750" indent="-285750">
+              <a:lnSpc>
+                <a:spcPct val="150000"/>
+              </a:lnSpc>
+              <a:spcBef>
+                <a:spcPts val="600"/>
+              </a:spcBef>
+              <a:buFont typeface="Arial" panose="020B0604020202020204" pitchFamily="34" charset="0"/>
+              <a:buChar char="•"/>
+            </a:pPr>
+            <a:r>
+              <a:rPr lang="en-US" sz="2000" dirty="0" err="1"/>
+              <a:t>PowerCLI</a:t>
+            </a:r>
+            <a:r>
+              <a:rPr lang="en-US" sz="2000" dirty="0"/>
+              <a:t> is a (very decent) selection</a:t>
+            </a:r>
+          </a:p>
+          <a:p>
+            <a:pPr marL="285750" indent="-285750">
+              <a:lnSpc>
+                <a:spcPct val="150000"/>
+              </a:lnSpc>
+              <a:spcBef>
+                <a:spcPts val="600"/>
+              </a:spcBef>
+              <a:buFont typeface="Arial" panose="020B0604020202020204" pitchFamily="34" charset="0"/>
+              <a:buChar char="•"/>
+            </a:pPr>
+            <a:r>
+              <a:rPr lang="en-US" sz="2000" dirty="0">
+                <a:solidFill>
+                  <a:schemeClr val="tx1"/>
+                </a:solidFill>
+              </a:rPr>
+              <a:t>Use the API (for the full experience … and speed)</a:t>
+            </a:r>
+          </a:p>
+        </p:txBody>
+      </p:sp>
+    </p:spTree>
+    <p:extLst>
+      <p:ext uri="{BB962C8B-B14F-4D97-AF65-F5344CB8AC3E}">
+        <p14:creationId xmlns:p14="http://schemas.microsoft.com/office/powerpoint/2010/main" val="1773500885"/>
+      </p:ext>
+    </p:extLst>
+  </p:cSld>
+  <p:clrMapOvr>
+    <a:masterClrMapping/>
+  </p:clrMapOvr>
+</p:sld>
+</file>
+
+<file path=ppt/slides/slide15.xml><?xml version="1.0" encoding="utf-8"?>
+<p:sld xmlns:a="http://schemas.openxmlformats.org/drawingml/2006/main" xmlns:r="http://schemas.openxmlformats.org/officeDocument/2006/relationships" xmlns:p="http://schemas.openxmlformats.org/presentationml/2006/main">
+  <p:cSld>
+    <p:spTree>
+      <p:nvGrpSpPr>
+        <p:cNvPr id="1" name=""/>
+        <p:cNvGrpSpPr/>
+        <p:nvPr/>
+      </p:nvGrpSpPr>
+      <p:grpSpPr>
+        <a:xfrm>
+          <a:off x="0" y="0"/>
+          <a:ext cx="0" cy="0"/>
+          <a:chOff x="0" y="0"/>
+          <a:chExt cx="0" cy="0"/>
+        </a:xfrm>
+      </p:grpSpPr>
+      <p:pic>
+        <p:nvPicPr>
+          <p:cNvPr id="4098" name="Picture 2" descr="Meme Creator - Funny and now for a live demo Meme Generator at  MemeCreator.org!">
+            <a:extLst>
+              <a:ext uri="{FF2B5EF4-FFF2-40B4-BE49-F238E27FC236}">
+                <a16:creationId xmlns:a16="http://schemas.microsoft.com/office/drawing/2014/main" id="{31787765-0DEA-4DD0-97B1-719ED3BED09F}"/>
+              </a:ext>
+            </a:extLst>
+          </p:cNvPr>
+          <p:cNvPicPr>
+            <a:picLocks noChangeAspect="1" noChangeArrowheads="1"/>
+          </p:cNvPicPr>
+          <p:nvPr/>
+        </p:nvPicPr>
+        <p:blipFill>
+          <a:blip r:embed="rId2">
+            <a:extLst>
+              <a:ext uri="{28A0092B-C50C-407E-A947-70E740481C1C}">
+                <a14:useLocalDpi xmlns:a14="http://schemas.microsoft.com/office/drawing/2010/main" val="0"/>
+              </a:ext>
+            </a:extLst>
+          </a:blip>
+          <a:srcRect/>
+          <a:stretch>
+            <a:fillRect/>
+          </a:stretch>
+        </p:blipFill>
+        <p:spPr bwMode="auto">
+          <a:xfrm>
+            <a:off x="4016171" y="1663200"/>
+            <a:ext cx="4159658" cy="3160050"/>
+          </a:xfrm>
+          <a:prstGeom prst="rect">
+            <a:avLst/>
+          </a:prstGeom>
+          <a:noFill/>
+          <a:extLst>
+            <a:ext uri="{909E8E84-426E-40DD-AFC4-6F175D3DCCD1}">
+              <a14:hiddenFill xmlns:a14="http://schemas.microsoft.com/office/drawing/2010/main">
+                <a:solidFill>
+                  <a:srgbClr val="FFFFFF"/>
+                </a:solidFill>
+              </a14:hiddenFill>
+            </a:ext>
+          </a:extLst>
+        </p:spPr>
+      </p:pic>
+    </p:spTree>
+    <p:extLst>
+      <p:ext uri="{BB962C8B-B14F-4D97-AF65-F5344CB8AC3E}">
+        <p14:creationId xmlns:p14="http://schemas.microsoft.com/office/powerpoint/2010/main" val="1890015506"/>
+      </p:ext>
+    </p:extLst>
+  </p:cSld>
+  <p:clrMapOvr>
+    <a:masterClrMapping/>
+  </p:clrMapOvr>
+</p:sld>
+</file>
+
+<file path=ppt/slides/slide16.xml><?xml version="1.0" encoding="utf-8"?>
+<p:sld xmlns:a="http://schemas.openxmlformats.org/drawingml/2006/main" xmlns:r="http://schemas.openxmlformats.org/officeDocument/2006/relationships" xmlns:p="http://schemas.openxmlformats.org/presentationml/2006/main">
+  <p:cSld>
+    <p:spTree>
+      <p:nvGrpSpPr>
+        <p:cNvPr id="1" name=""/>
+        <p:cNvGrpSpPr/>
+        <p:nvPr/>
+      </p:nvGrpSpPr>
+      <p:grpSpPr>
+        <a:xfrm>
+          <a:off x="0" y="0"/>
+          <a:ext cx="0" cy="0"/>
+          <a:chOff x="0" y="0"/>
+          <a:chExt cx="0" cy="0"/>
+        </a:xfrm>
+      </p:grpSpPr>
+      <p:sp>
+        <p:nvSpPr>
+          <p:cNvPr id="2" name="Title 1"/>
+          <p:cNvSpPr>
+            <a:spLocks noGrp="1"/>
+          </p:cNvSpPr>
+          <p:nvPr>
+            <p:ph type="title"/>
+          </p:nvPr>
+        </p:nvSpPr>
+        <p:spPr>
+          <a:xfrm>
+            <a:off x="4675695" y="3879568"/>
+            <a:ext cx="6202837" cy="900246"/>
+          </a:xfrm>
+        </p:spPr>
+        <p:txBody>
+          <a:bodyPr/>
+          <a:lstStyle/>
+          <a:p>
+            <a:r>
+              <a:rPr lang="en-US" dirty="0"/>
+              <a:t>An Example</a:t>
+            </a:r>
+          </a:p>
+        </p:txBody>
+      </p:sp>
+      <p:sp>
+        <p:nvSpPr>
+          <p:cNvPr id="3" name="Text Placeholder 2"/>
+          <p:cNvSpPr>
+            <a:spLocks noGrp="1"/>
+          </p:cNvSpPr>
+          <p:nvPr>
+            <p:ph type="body" sz="quarter" idx="13"/>
+          </p:nvPr>
+        </p:nvSpPr>
+        <p:spPr>
+          <a:xfrm>
+            <a:off x="1185737" y="4891285"/>
+            <a:ext cx="2063750" cy="1384995"/>
+          </a:xfrm>
+        </p:spPr>
+        <p:txBody>
+          <a:bodyPr/>
+          <a:lstStyle/>
+          <a:p>
+            <a:r>
+              <a:rPr lang="en-US" dirty="0"/>
+              <a:t>5</a:t>
+            </a:r>
+          </a:p>
+        </p:txBody>
+      </p:sp>
+    </p:spTree>
+    <p:extLst>
+      <p:ext uri="{BB962C8B-B14F-4D97-AF65-F5344CB8AC3E}">
+        <p14:creationId xmlns:p14="http://schemas.microsoft.com/office/powerpoint/2010/main" val="866096733"/>
+      </p:ext>
+    </p:extLst>
+  </p:cSld>
+  <p:clrMapOvr>
+    <a:masterClrMapping/>
+  </p:clrMapOvr>
+</p:sld>
+</file>
+
+<file path=ppt/slides/slide17.xml><?xml version="1.0" encoding="utf-8"?>
+<p:sld xmlns:a="http://schemas.openxmlformats.org/drawingml/2006/main" xmlns:r="http://schemas.openxmlformats.org/officeDocument/2006/relationships" xmlns:p="http://schemas.openxmlformats.org/presentationml/2006/main">
+  <p:cSld>
+    <p:spTree>
+      <p:nvGrpSpPr>
+        <p:cNvPr id="1" name=""/>
+        <p:cNvGrpSpPr/>
+        <p:nvPr/>
+      </p:nvGrpSpPr>
+      <p:grpSpPr>
+        <a:xfrm>
+          <a:off x="0" y="0"/>
+          <a:ext cx="0" cy="0"/>
+          <a:chOff x="0" y="0"/>
+          <a:chExt cx="0" cy="0"/>
+        </a:xfrm>
+      </p:grpSpPr>
+      <p:pic>
+        <p:nvPicPr>
+          <p:cNvPr id="6150" name="Picture 6" descr="Demo Time What could go wrong? - Disaster Girl | Meme Generator">
+            <a:extLst>
+              <a:ext uri="{FF2B5EF4-FFF2-40B4-BE49-F238E27FC236}">
+                <a16:creationId xmlns:a16="http://schemas.microsoft.com/office/drawing/2014/main" id="{C94D8C38-2B04-4ADA-9B35-0858E61B48C6}"/>
+              </a:ext>
+            </a:extLst>
+          </p:cNvPr>
+          <p:cNvPicPr>
+            <a:picLocks noChangeAspect="1" noChangeArrowheads="1"/>
+          </p:cNvPicPr>
+          <p:nvPr/>
+        </p:nvPicPr>
+        <p:blipFill>
+          <a:blip r:embed="rId2">
+            <a:extLst>
+              <a:ext uri="{28A0092B-C50C-407E-A947-70E740481C1C}">
+                <a14:useLocalDpi xmlns:a14="http://schemas.microsoft.com/office/drawing/2010/main" val="0"/>
+              </a:ext>
+            </a:extLst>
+          </a:blip>
+          <a:srcRect/>
+          <a:stretch>
+            <a:fillRect/>
+          </a:stretch>
+        </p:blipFill>
+        <p:spPr bwMode="auto">
+          <a:xfrm>
+            <a:off x="3167062" y="1233487"/>
+            <a:ext cx="5857875" cy="4391025"/>
+          </a:xfrm>
+          <a:prstGeom prst="rect">
+            <a:avLst/>
+          </a:prstGeom>
+          <a:noFill/>
+          <a:extLst>
+            <a:ext uri="{909E8E84-426E-40DD-AFC4-6F175D3DCCD1}">
+              <a14:hiddenFill xmlns:a14="http://schemas.microsoft.com/office/drawing/2010/main">
+                <a:solidFill>
+                  <a:srgbClr val="FFFFFF"/>
+                </a:solidFill>
+              </a14:hiddenFill>
+            </a:ext>
+          </a:extLst>
+        </p:spPr>
+      </p:pic>
+    </p:spTree>
+    <p:extLst>
+      <p:ext uri="{BB962C8B-B14F-4D97-AF65-F5344CB8AC3E}">
+        <p14:creationId xmlns:p14="http://schemas.microsoft.com/office/powerpoint/2010/main" val="2730870854"/>
+      </p:ext>
+    </p:extLst>
+  </p:cSld>
+  <p:clrMapOvr>
+    <a:masterClrMapping/>
+  </p:clrMapOvr>
+</p:sld>
+</file>
+
+<file path=ppt/slides/slide18.xml><?xml version="1.0" encoding="utf-8"?>
+<p:sld xmlns:a="http://schemas.openxmlformats.org/drawingml/2006/main" xmlns:r="http://schemas.openxmlformats.org/officeDocument/2006/relationships" xmlns:p="http://schemas.openxmlformats.org/presentationml/2006/main">
+  <p:cSld>
+    <p:spTree>
+      <p:nvGrpSpPr>
+        <p:cNvPr id="1" name=""/>
+        <p:cNvGrpSpPr/>
+        <p:nvPr/>
+      </p:nvGrpSpPr>
+      <p:grpSpPr>
+        <a:xfrm>
+          <a:off x="0" y="0"/>
+          <a:ext cx="0" cy="0"/>
+          <a:chOff x="0" y="0"/>
+          <a:chExt cx="0" cy="0"/>
+        </a:xfrm>
+      </p:grpSpPr>
+      <p:sp>
+        <p:nvSpPr>
+          <p:cNvPr id="2" name="Title 1"/>
+          <p:cNvSpPr>
+            <a:spLocks noGrp="1"/>
+          </p:cNvSpPr>
+          <p:nvPr>
+            <p:ph type="title"/>
+          </p:nvPr>
+        </p:nvSpPr>
+        <p:spPr>
+          <a:xfrm>
+            <a:off x="4675695" y="3879568"/>
+            <a:ext cx="6202837" cy="900246"/>
+          </a:xfrm>
+        </p:spPr>
+        <p:txBody>
+          <a:bodyPr/>
+          <a:lstStyle/>
+          <a:p>
+            <a:r>
+              <a:rPr lang="en-US" dirty="0"/>
+              <a:t>Take </a:t>
+            </a:r>
+            <a:r>
+              <a:rPr lang="en-US" dirty="0" err="1"/>
+              <a:t>Aways</a:t>
+            </a:r>
+            <a:endParaRPr lang="en-US" dirty="0"/>
+          </a:p>
+        </p:txBody>
+      </p:sp>
+      <p:sp>
+        <p:nvSpPr>
+          <p:cNvPr id="3" name="Text Placeholder 2"/>
+          <p:cNvSpPr>
+            <a:spLocks noGrp="1"/>
+          </p:cNvSpPr>
+          <p:nvPr>
+            <p:ph type="body" sz="quarter" idx="13"/>
+          </p:nvPr>
+        </p:nvSpPr>
+        <p:spPr>
+          <a:xfrm>
+            <a:off x="1185737" y="4891285"/>
+            <a:ext cx="2063750" cy="1384995"/>
+          </a:xfrm>
+        </p:spPr>
+        <p:txBody>
+          <a:bodyPr/>
+          <a:lstStyle/>
+          <a:p>
+            <a:r>
+              <a:rPr lang="en-US" dirty="0"/>
+              <a:t>6</a:t>
+            </a:r>
+          </a:p>
+        </p:txBody>
+      </p:sp>
+    </p:spTree>
+    <p:extLst>
+      <p:ext uri="{BB962C8B-B14F-4D97-AF65-F5344CB8AC3E}">
+        <p14:creationId xmlns:p14="http://schemas.microsoft.com/office/powerpoint/2010/main" val="2415615501"/>
+      </p:ext>
+    </p:extLst>
+  </p:cSld>
+  <p:clrMapOvr>
+    <a:masterClrMapping/>
+  </p:clrMapOvr>
+</p:sld>
+</file>
+
+<file path=ppt/slides/slide19.xml><?xml version="1.0" encoding="utf-8"?>
+<p:sld xmlns:a="http://schemas.openxmlformats.org/drawingml/2006/main" xmlns:r="http://schemas.openxmlformats.org/officeDocument/2006/relationships" xmlns:p="http://schemas.openxmlformats.org/presentationml/2006/main">
+  <p:cSld>
+    <p:spTree>
+      <p:nvGrpSpPr>
+        <p:cNvPr id="1" name=""/>
+        <p:cNvGrpSpPr/>
+        <p:nvPr/>
+      </p:nvGrpSpPr>
+      <p:grpSpPr>
+        <a:xfrm>
+          <a:off x="0" y="0"/>
+          <a:ext cx="0" cy="0"/>
+          <a:chOff x="0" y="0"/>
+          <a:chExt cx="0" cy="0"/>
+        </a:xfrm>
+      </p:grpSpPr>
+      <p:sp>
+        <p:nvSpPr>
+          <p:cNvPr id="2" name="Title 1"/>
+          <p:cNvSpPr>
+            <a:spLocks noGrp="1"/>
+          </p:cNvSpPr>
+          <p:nvPr>
+            <p:ph type="title"/>
+          </p:nvPr>
+        </p:nvSpPr>
+        <p:spPr/>
+        <p:txBody>
+          <a:bodyPr/>
+          <a:lstStyle/>
+          <a:p>
+            <a:r>
+              <a:rPr lang="en-US" dirty="0"/>
+              <a:t>Takeaways</a:t>
+            </a:r>
+          </a:p>
+        </p:txBody>
+      </p:sp>
+      <p:sp>
+        <p:nvSpPr>
+          <p:cNvPr id="4" name="TextBox 3">
+            <a:extLst>
+              <a:ext uri="{FF2B5EF4-FFF2-40B4-BE49-F238E27FC236}">
+                <a16:creationId xmlns:a16="http://schemas.microsoft.com/office/drawing/2014/main" id="{B73D39A4-9066-46AF-99AA-882BB8906B5D}"/>
+              </a:ext>
+            </a:extLst>
+          </p:cNvPr>
+          <p:cNvSpPr txBox="1"/>
+          <p:nvPr/>
+        </p:nvSpPr>
+        <p:spPr bwMode="gray">
+          <a:xfrm>
+            <a:off x="2678400" y="1879200"/>
+            <a:ext cx="5716800" cy="2373022"/>
+          </a:xfrm>
+          <a:prstGeom prst="rect">
+            <a:avLst/>
+          </a:prstGeom>
+          <a:noFill/>
+        </p:spPr>
+        <p:txBody>
+          <a:bodyPr wrap="square" lIns="0" tIns="0" rIns="0" bIns="0" rtlCol="0">
+            <a:spAutoFit/>
+          </a:bodyPr>
+          <a:lstStyle/>
+          <a:p>
+            <a:pPr>
+              <a:lnSpc>
+                <a:spcPct val="150000"/>
+              </a:lnSpc>
+              <a:spcBef>
+                <a:spcPts val="600"/>
+              </a:spcBef>
+            </a:pPr>
+            <a:r>
+              <a:rPr lang="en-US" sz="2000" dirty="0">
+                <a:solidFill>
+                  <a:schemeClr val="tx1"/>
+                </a:solidFill>
+              </a:rPr>
+              <a:t>Your code is perfect!</a:t>
+            </a:r>
+          </a:p>
+          <a:p>
+            <a:pPr>
+              <a:lnSpc>
+                <a:spcPct val="150000"/>
+              </a:lnSpc>
+              <a:spcBef>
+                <a:spcPts val="600"/>
+              </a:spcBef>
+            </a:pPr>
+            <a:r>
+              <a:rPr lang="en-US" sz="2000" dirty="0"/>
+              <a:t>But his/hers might be a bit more perfect </a:t>
+            </a:r>
+            <a:r>
+              <a:rPr lang="en-US" sz="2000" dirty="0">
+                <a:sym typeface="Wingdings" panose="05000000000000000000" pitchFamily="2" charset="2"/>
+              </a:rPr>
+              <a:t></a:t>
+            </a:r>
+          </a:p>
+          <a:p>
+            <a:pPr>
+              <a:lnSpc>
+                <a:spcPct val="150000"/>
+              </a:lnSpc>
+              <a:spcBef>
+                <a:spcPts val="600"/>
+              </a:spcBef>
+            </a:pPr>
+            <a:r>
+              <a:rPr lang="en-US" sz="2000" dirty="0">
+                <a:solidFill>
+                  <a:schemeClr val="tx1"/>
+                </a:solidFill>
+              </a:rPr>
+              <a:t>Learning = reading, watching, trying</a:t>
+            </a:r>
+          </a:p>
+          <a:p>
+            <a:pPr>
+              <a:lnSpc>
+                <a:spcPct val="150000"/>
+              </a:lnSpc>
+              <a:spcBef>
+                <a:spcPts val="600"/>
+              </a:spcBef>
+            </a:pPr>
+            <a:r>
+              <a:rPr lang="en-US" sz="2000" dirty="0">
+                <a:solidFill>
+                  <a:schemeClr val="tx1"/>
+                </a:solidFill>
+              </a:rPr>
+              <a:t>Dare to revisit</a:t>
+            </a:r>
+          </a:p>
+          <a:p>
+            <a:pPr marL="285750" indent="-285750">
+              <a:lnSpc>
+                <a:spcPct val="110000"/>
+              </a:lnSpc>
+              <a:spcBef>
+                <a:spcPts val="600"/>
+              </a:spcBef>
+              <a:buFont typeface="Arial" panose="020B0604020202020204" pitchFamily="34" charset="0"/>
+              <a:buChar char="•"/>
+            </a:pPr>
+            <a:endParaRPr lang="en-US" sz="1400" dirty="0" err="1">
+              <a:solidFill>
+                <a:schemeClr val="tx1"/>
+              </a:solidFill>
+            </a:endParaRPr>
+          </a:p>
+        </p:txBody>
+      </p:sp>
+    </p:spTree>
+    <p:extLst>
+      <p:ext uri="{BB962C8B-B14F-4D97-AF65-F5344CB8AC3E}">
+        <p14:creationId xmlns:p14="http://schemas.microsoft.com/office/powerpoint/2010/main" val="3733450216"/>
       </p:ext>
     </p:extLst>
   </p:cSld>
@@ -7298,10 +8860,572 @@
           <a:chExt cx="0" cy="0"/>
         </a:xfrm>
       </p:grpSpPr>
+      <p:sp>
+        <p:nvSpPr>
+          <p:cNvPr id="2" name="Title 1"/>
+          <p:cNvSpPr>
+            <a:spLocks noGrp="1"/>
+          </p:cNvSpPr>
+          <p:nvPr>
+            <p:ph type="title"/>
+          </p:nvPr>
+        </p:nvSpPr>
+        <p:spPr>
+          <a:xfrm>
+            <a:off x="1157054" y="438355"/>
+            <a:ext cx="4932661" cy="276999"/>
+          </a:xfrm>
+        </p:spPr>
+        <p:txBody>
+          <a:bodyPr/>
+          <a:lstStyle/>
+          <a:p>
+            <a:r>
+              <a:rPr lang="en-US" sz="2000" dirty="0"/>
+              <a:t>Bio</a:t>
+            </a:r>
+          </a:p>
+        </p:txBody>
+      </p:sp>
+      <p:sp>
+        <p:nvSpPr>
+          <p:cNvPr id="5" name="TextBox 4">
+            <a:extLst>
+              <a:ext uri="{FF2B5EF4-FFF2-40B4-BE49-F238E27FC236}">
+                <a16:creationId xmlns:a16="http://schemas.microsoft.com/office/drawing/2014/main" id="{46534A2A-AD07-4F36-9609-2441296B0003}"/>
+              </a:ext>
+            </a:extLst>
+          </p:cNvPr>
+          <p:cNvSpPr txBox="1"/>
+          <p:nvPr/>
+        </p:nvSpPr>
+        <p:spPr bwMode="gray">
+          <a:xfrm>
+            <a:off x="2075400" y="1891647"/>
+            <a:ext cx="6094800" cy="3366306"/>
+          </a:xfrm>
+          <a:prstGeom prst="rect">
+            <a:avLst/>
+          </a:prstGeom>
+          <a:noFill/>
+        </p:spPr>
+        <p:txBody>
+          <a:bodyPr wrap="square">
+            <a:spAutoFit/>
+          </a:bodyPr>
+          <a:lstStyle/>
+          <a:p>
+            <a:pPr marL="285750" marR="0" lvl="0" indent="-285750" algn="l" defTabSz="914400" rtl="0" eaLnBrk="1" fontAlgn="auto" latinLnBrk="0" hangingPunct="1">
+              <a:lnSpc>
+                <a:spcPct val="110000"/>
+              </a:lnSpc>
+              <a:spcBef>
+                <a:spcPts val="600"/>
+              </a:spcBef>
+              <a:spcAft>
+                <a:spcPts val="0"/>
+              </a:spcAft>
+              <a:buClrTx/>
+              <a:buSzTx/>
+              <a:buFont typeface="Arial" panose="020B0604020202020204" pitchFamily="34" charset="0"/>
+              <a:buChar char="•"/>
+              <a:tabLst/>
+              <a:defRPr/>
+            </a:pPr>
+            <a:r>
+              <a:rPr kumimoji="0" lang="en-US" sz="2400" b="0" i="0" u="none" strike="noStrike" kern="1200" cap="none" spc="0" normalizeH="0" baseline="0" noProof="0" dirty="0">
+                <a:ln>
+                  <a:noFill/>
+                </a:ln>
+                <a:solidFill>
+                  <a:srgbClr val="4D4D4F"/>
+                </a:solidFill>
+                <a:effectLst/>
+                <a:uLnTx/>
+                <a:uFillTx/>
+                <a:latin typeface="Arial" panose="020B0604020202020204"/>
+                <a:ea typeface="+mn-ea"/>
+                <a:cs typeface="+mn-cs"/>
+              </a:rPr>
+              <a:t>Former Systems Engineer</a:t>
+            </a:r>
+          </a:p>
+          <a:p>
+            <a:pPr marL="742950" marR="0" lvl="1" indent="-285750" algn="l" defTabSz="914400" rtl="0" eaLnBrk="1" fontAlgn="auto" latinLnBrk="0" hangingPunct="1">
+              <a:lnSpc>
+                <a:spcPct val="110000"/>
+              </a:lnSpc>
+              <a:spcBef>
+                <a:spcPts val="600"/>
+              </a:spcBef>
+              <a:spcAft>
+                <a:spcPts val="0"/>
+              </a:spcAft>
+              <a:buClrTx/>
+              <a:buSzTx/>
+              <a:buFont typeface="Arial" panose="020B0604020202020204" pitchFamily="34" charset="0"/>
+              <a:buChar char="•"/>
+              <a:tabLst/>
+              <a:defRPr/>
+            </a:pPr>
+            <a:r>
+              <a:rPr kumimoji="0" lang="en-US" sz="2400" b="0" i="0" u="none" strike="noStrike" kern="1200" cap="none" spc="0" normalizeH="0" baseline="0" noProof="0" dirty="0">
+                <a:ln>
+                  <a:noFill/>
+                </a:ln>
+                <a:solidFill>
+                  <a:srgbClr val="4D4D4F"/>
+                </a:solidFill>
+                <a:effectLst/>
+                <a:uLnTx/>
+                <a:uFillTx/>
+                <a:latin typeface="Arial" panose="020B0604020202020204"/>
+                <a:ea typeface="+mn-ea"/>
+                <a:cs typeface="+mn-cs"/>
+              </a:rPr>
+              <a:t>‘</a:t>
+            </a:r>
+            <a:r>
+              <a:rPr kumimoji="0" lang="en-US" sz="2400" b="0" i="1" u="none" strike="noStrike" kern="1200" cap="none" spc="0" normalizeH="0" baseline="0" noProof="0" dirty="0">
+                <a:ln>
+                  <a:noFill/>
+                </a:ln>
+                <a:solidFill>
+                  <a:srgbClr val="4D4D4F"/>
+                </a:solidFill>
+                <a:effectLst/>
+                <a:uLnTx/>
+                <a:uFillTx/>
+                <a:latin typeface="Arial" panose="020B0604020202020204"/>
+                <a:ea typeface="+mn-ea"/>
+                <a:cs typeface="+mn-cs"/>
+              </a:rPr>
+              <a:t>Dolce far niente</a:t>
+            </a:r>
+            <a:r>
+              <a:rPr kumimoji="0" lang="en-US" sz="2400" b="0" i="0" u="none" strike="noStrike" kern="1200" cap="none" spc="0" normalizeH="0" baseline="0" noProof="0" dirty="0">
+                <a:ln>
+                  <a:noFill/>
+                </a:ln>
+                <a:solidFill>
+                  <a:srgbClr val="4D4D4F"/>
+                </a:solidFill>
+                <a:effectLst/>
+                <a:uLnTx/>
+                <a:uFillTx/>
+                <a:latin typeface="Arial" panose="020B0604020202020204"/>
+                <a:ea typeface="+mn-ea"/>
+                <a:cs typeface="+mn-cs"/>
+              </a:rPr>
+              <a:t>’ since 01/01/2020</a:t>
+            </a:r>
+          </a:p>
+          <a:p>
+            <a:pPr marL="285750" marR="0" lvl="0" indent="-285750" algn="l" defTabSz="914400" rtl="0" eaLnBrk="1" fontAlgn="auto" latinLnBrk="0" hangingPunct="1">
+              <a:lnSpc>
+                <a:spcPct val="110000"/>
+              </a:lnSpc>
+              <a:spcBef>
+                <a:spcPts val="600"/>
+              </a:spcBef>
+              <a:spcAft>
+                <a:spcPts val="0"/>
+              </a:spcAft>
+              <a:buClrTx/>
+              <a:buSzTx/>
+              <a:buFont typeface="Arial" panose="020B0604020202020204" pitchFamily="34" charset="0"/>
+              <a:buChar char="•"/>
+              <a:tabLst/>
+              <a:defRPr/>
+            </a:pPr>
+            <a:r>
+              <a:rPr kumimoji="0" lang="en-US" sz="2400" b="0" i="0" u="none" strike="noStrike" kern="1200" cap="none" spc="0" normalizeH="0" baseline="0" noProof="0" dirty="0" err="1">
+                <a:ln>
+                  <a:noFill/>
+                </a:ln>
+                <a:solidFill>
+                  <a:srgbClr val="4D4D4F"/>
+                </a:solidFill>
+                <a:effectLst/>
+                <a:uLnTx/>
+                <a:uFillTx/>
+                <a:latin typeface="Arial" panose="020B0604020202020204"/>
+                <a:ea typeface="+mn-ea"/>
+                <a:cs typeface="+mn-cs"/>
+              </a:rPr>
+              <a:t>PowerCLI</a:t>
+            </a:r>
+            <a:r>
+              <a:rPr kumimoji="0" lang="en-US" sz="2400" b="0" i="0" u="none" strike="noStrike" kern="1200" cap="none" spc="0" normalizeH="0" baseline="0" noProof="0" dirty="0">
+                <a:ln>
+                  <a:noFill/>
+                </a:ln>
+                <a:solidFill>
+                  <a:srgbClr val="4D4D4F"/>
+                </a:solidFill>
+                <a:effectLst/>
+                <a:uLnTx/>
+                <a:uFillTx/>
+                <a:latin typeface="Arial" panose="020B0604020202020204"/>
+                <a:ea typeface="+mn-ea"/>
+                <a:cs typeface="+mn-cs"/>
+              </a:rPr>
+              <a:t> user since 2007</a:t>
+            </a:r>
+          </a:p>
+          <a:p>
+            <a:pPr marL="285750" marR="0" lvl="0" indent="-285750" algn="l" defTabSz="914400" rtl="0" eaLnBrk="1" fontAlgn="auto" latinLnBrk="0" hangingPunct="1">
+              <a:lnSpc>
+                <a:spcPct val="110000"/>
+              </a:lnSpc>
+              <a:spcBef>
+                <a:spcPts val="600"/>
+              </a:spcBef>
+              <a:spcAft>
+                <a:spcPts val="0"/>
+              </a:spcAft>
+              <a:buClrTx/>
+              <a:buSzTx/>
+              <a:buFont typeface="Arial" panose="020B0604020202020204" pitchFamily="34" charset="0"/>
+              <a:buChar char="•"/>
+              <a:tabLst/>
+              <a:defRPr/>
+            </a:pPr>
+            <a:r>
+              <a:rPr kumimoji="0" lang="en-US" sz="2400" b="0" i="0" u="none" strike="noStrike" kern="1200" cap="none" spc="0" normalizeH="0" baseline="0" noProof="0" dirty="0">
+                <a:ln>
+                  <a:noFill/>
+                </a:ln>
+                <a:solidFill>
+                  <a:srgbClr val="4D4D4F"/>
+                </a:solidFill>
+                <a:effectLst/>
+                <a:uLnTx/>
+                <a:uFillTx/>
+                <a:latin typeface="Arial" panose="020B0604020202020204"/>
+                <a:ea typeface="+mn-ea"/>
+                <a:cs typeface="+mn-cs"/>
+              </a:rPr>
+              <a:t>Contact</a:t>
+            </a:r>
+          </a:p>
+          <a:p>
+            <a:pPr marL="742950" marR="0" lvl="1" indent="-285750" algn="l" defTabSz="914400" rtl="0" eaLnBrk="1" fontAlgn="auto" latinLnBrk="0" hangingPunct="1">
+              <a:lnSpc>
+                <a:spcPct val="110000"/>
+              </a:lnSpc>
+              <a:spcBef>
+                <a:spcPts val="600"/>
+              </a:spcBef>
+              <a:spcAft>
+                <a:spcPts val="0"/>
+              </a:spcAft>
+              <a:buClrTx/>
+              <a:buSzTx/>
+              <a:buFont typeface="Arial" panose="020B0604020202020204" pitchFamily="34" charset="0"/>
+              <a:buChar char="•"/>
+              <a:tabLst/>
+              <a:defRPr/>
+            </a:pPr>
+            <a:r>
+              <a:rPr kumimoji="0" lang="en-US" sz="2400" b="0" i="0" u="none" strike="noStrike" kern="1200" cap="none" spc="0" normalizeH="0" baseline="0" noProof="0" dirty="0">
+                <a:ln>
+                  <a:noFill/>
+                </a:ln>
+                <a:solidFill>
+                  <a:srgbClr val="4D4D4F"/>
+                </a:solidFill>
+                <a:effectLst/>
+                <a:uLnTx/>
+                <a:uFillTx/>
+                <a:latin typeface="Arial" panose="020B0604020202020204"/>
+                <a:ea typeface="+mn-ea"/>
+                <a:cs typeface="+mn-cs"/>
+              </a:rPr>
+              <a:t>Twitter: </a:t>
+            </a:r>
+            <a:r>
+              <a:rPr kumimoji="0" lang="en-US" sz="2400" b="0" i="0" u="none" strike="noStrike" kern="1200" cap="none" spc="0" normalizeH="0" baseline="0" noProof="0" dirty="0">
+                <a:ln>
+                  <a:noFill/>
+                </a:ln>
+                <a:solidFill>
+                  <a:srgbClr val="4D4D4F"/>
+                </a:solidFill>
+                <a:effectLst/>
+                <a:uLnTx/>
+                <a:uFillTx/>
+                <a:latin typeface="Arial" panose="020B0604020202020204"/>
+                <a:ea typeface="+mn-ea"/>
+                <a:cs typeface="+mn-cs"/>
+                <a:hlinkClick r:id="rId2"/>
+              </a:rPr>
+              <a:t>LucD22</a:t>
+            </a:r>
+            <a:endParaRPr kumimoji="0" lang="en-US" sz="2400" b="0" i="0" u="none" strike="noStrike" kern="1200" cap="none" spc="0" normalizeH="0" baseline="0" noProof="0" dirty="0">
+              <a:ln>
+                <a:noFill/>
+              </a:ln>
+              <a:solidFill>
+                <a:srgbClr val="4D4D4F"/>
+              </a:solidFill>
+              <a:effectLst/>
+              <a:uLnTx/>
+              <a:uFillTx/>
+              <a:latin typeface="Arial" panose="020B0604020202020204"/>
+              <a:ea typeface="+mn-ea"/>
+              <a:cs typeface="+mn-cs"/>
+            </a:endParaRPr>
+          </a:p>
+          <a:p>
+            <a:pPr marL="742950" marR="0" lvl="1" indent="-285750" algn="l" defTabSz="914400" rtl="0" eaLnBrk="1" fontAlgn="auto" latinLnBrk="0" hangingPunct="1">
+              <a:lnSpc>
+                <a:spcPct val="110000"/>
+              </a:lnSpc>
+              <a:spcBef>
+                <a:spcPts val="600"/>
+              </a:spcBef>
+              <a:spcAft>
+                <a:spcPts val="0"/>
+              </a:spcAft>
+              <a:buClrTx/>
+              <a:buSzTx/>
+              <a:buFont typeface="Arial" panose="020B0604020202020204" pitchFamily="34" charset="0"/>
+              <a:buChar char="•"/>
+              <a:tabLst/>
+              <a:defRPr/>
+            </a:pPr>
+            <a:r>
+              <a:rPr kumimoji="0" lang="en-US" sz="2400" b="0" i="0" u="none" strike="noStrike" kern="1200" cap="none" spc="0" normalizeH="0" baseline="0" noProof="0" dirty="0">
+                <a:ln>
+                  <a:noFill/>
+                </a:ln>
+                <a:solidFill>
+                  <a:srgbClr val="4D4D4F"/>
+                </a:solidFill>
+                <a:effectLst/>
+                <a:uLnTx/>
+                <a:uFillTx/>
+                <a:latin typeface="Arial" panose="020B0604020202020204"/>
+                <a:ea typeface="+mn-ea"/>
+                <a:cs typeface="+mn-cs"/>
+              </a:rPr>
+              <a:t>Blog: </a:t>
+            </a:r>
+            <a:r>
+              <a:rPr kumimoji="0" lang="en-US" sz="2400" b="0" i="0" u="none" strike="noStrike" kern="1200" cap="none" spc="0" normalizeH="0" baseline="0" noProof="0" dirty="0">
+                <a:ln>
+                  <a:noFill/>
+                </a:ln>
+                <a:solidFill>
+                  <a:srgbClr val="4D4D4F"/>
+                </a:solidFill>
+                <a:effectLst/>
+                <a:uLnTx/>
+                <a:uFillTx/>
+                <a:latin typeface="Arial" panose="020B0604020202020204"/>
+                <a:ea typeface="+mn-ea"/>
+                <a:cs typeface="+mn-cs"/>
+                <a:hlinkClick r:id="rId3"/>
+              </a:rPr>
+              <a:t>lucd.info</a:t>
+            </a:r>
+            <a:endParaRPr kumimoji="0" lang="en-US" sz="2400" b="0" i="0" u="none" strike="noStrike" kern="1200" cap="none" spc="0" normalizeH="0" baseline="0" noProof="0" dirty="0">
+              <a:ln>
+                <a:noFill/>
+              </a:ln>
+              <a:solidFill>
+                <a:srgbClr val="4D4D4F"/>
+              </a:solidFill>
+              <a:effectLst/>
+              <a:uLnTx/>
+              <a:uFillTx/>
+              <a:latin typeface="Arial" panose="020B0604020202020204"/>
+              <a:ea typeface="+mn-ea"/>
+              <a:cs typeface="+mn-cs"/>
+            </a:endParaRPr>
+          </a:p>
+          <a:p>
+            <a:pPr marL="742950" marR="0" lvl="1" indent="-285750" algn="l" defTabSz="914400" rtl="0" eaLnBrk="1" fontAlgn="auto" latinLnBrk="0" hangingPunct="1">
+              <a:lnSpc>
+                <a:spcPct val="110000"/>
+              </a:lnSpc>
+              <a:spcBef>
+                <a:spcPts val="600"/>
+              </a:spcBef>
+              <a:spcAft>
+                <a:spcPts val="0"/>
+              </a:spcAft>
+              <a:buClrTx/>
+              <a:buSzTx/>
+              <a:buFont typeface="Arial" panose="020B0604020202020204" pitchFamily="34" charset="0"/>
+              <a:buChar char="•"/>
+              <a:tabLst/>
+              <a:defRPr/>
+            </a:pPr>
+            <a:r>
+              <a:rPr kumimoji="0" lang="en-US" sz="2400" b="0" i="0" u="none" strike="noStrike" kern="1200" cap="none" spc="0" normalizeH="0" baseline="0" noProof="0" dirty="0">
+                <a:ln>
+                  <a:noFill/>
+                </a:ln>
+                <a:solidFill>
+                  <a:srgbClr val="4D4D4F"/>
+                </a:solidFill>
+                <a:effectLst/>
+                <a:uLnTx/>
+                <a:uFillTx/>
+                <a:latin typeface="Arial" panose="020B0604020202020204"/>
+                <a:ea typeface="+mn-ea"/>
+                <a:cs typeface="+mn-cs"/>
+              </a:rPr>
+              <a:t>VMTN : </a:t>
+            </a:r>
+            <a:r>
+              <a:rPr kumimoji="0" lang="en-US" sz="2400" b="0" i="0" u="none" strike="noStrike" kern="1200" cap="none" spc="0" normalizeH="0" baseline="0" noProof="0" dirty="0" err="1">
+                <a:ln>
+                  <a:noFill/>
+                </a:ln>
+                <a:solidFill>
+                  <a:srgbClr val="4D4D4F"/>
+                </a:solidFill>
+                <a:effectLst/>
+                <a:uLnTx/>
+                <a:uFillTx/>
+                <a:latin typeface="Arial" panose="020B0604020202020204"/>
+                <a:ea typeface="+mn-ea"/>
+                <a:cs typeface="+mn-cs"/>
+                <a:hlinkClick r:id="rId4"/>
+              </a:rPr>
+              <a:t>lucd</a:t>
+            </a:r>
+            <a:endParaRPr kumimoji="0" lang="en-US" sz="2400" b="0" i="0" u="none" strike="noStrike" kern="1200" cap="none" spc="0" normalizeH="0" baseline="0" noProof="0" dirty="0">
+              <a:ln>
+                <a:noFill/>
+              </a:ln>
+              <a:solidFill>
+                <a:srgbClr val="4D4D4F"/>
+              </a:solidFill>
+              <a:effectLst/>
+              <a:uLnTx/>
+              <a:uFillTx/>
+              <a:latin typeface="Arial" panose="020B0604020202020204"/>
+              <a:ea typeface="+mn-ea"/>
+              <a:cs typeface="+mn-cs"/>
+            </a:endParaRPr>
+          </a:p>
+        </p:txBody>
+      </p:sp>
+      <p:pic>
+        <p:nvPicPr>
+          <p:cNvPr id="6" name="Picture 5" descr="A person wearing a costume&#10;&#10;Description automatically generated">
+            <a:extLst>
+              <a:ext uri="{FF2B5EF4-FFF2-40B4-BE49-F238E27FC236}">
+                <a16:creationId xmlns:a16="http://schemas.microsoft.com/office/drawing/2014/main" id="{F4F45D2C-307B-4C4F-ABC3-7E7CDB9389D8}"/>
+              </a:ext>
+            </a:extLst>
+          </p:cNvPr>
+          <p:cNvPicPr>
+            <a:picLocks noChangeAspect="1"/>
+          </p:cNvPicPr>
+          <p:nvPr/>
+        </p:nvPicPr>
+        <p:blipFill>
+          <a:blip r:embed="rId5"/>
+          <a:stretch>
+            <a:fillRect/>
+          </a:stretch>
+        </p:blipFill>
+        <p:spPr>
+          <a:xfrm>
+            <a:off x="9105128" y="2743200"/>
+            <a:ext cx="3086872" cy="4114800"/>
+          </a:xfrm>
+          <a:prstGeom prst="rect">
+            <a:avLst/>
+          </a:prstGeom>
+        </p:spPr>
+      </p:pic>
     </p:spTree>
     <p:extLst>
       <p:ext uri="{BB962C8B-B14F-4D97-AF65-F5344CB8AC3E}">
-        <p14:creationId xmlns:p14="http://schemas.microsoft.com/office/powerpoint/2010/main" val="795139880"/>
+        <p14:creationId xmlns:p14="http://schemas.microsoft.com/office/powerpoint/2010/main" val="474679900"/>
+      </p:ext>
+    </p:extLst>
+  </p:cSld>
+  <p:clrMapOvr>
+    <a:masterClrMapping/>
+  </p:clrMapOvr>
+</p:sld>
+</file>
+
+<file path=ppt/slides/slide20.xml><?xml version="1.0" encoding="utf-8"?>
+<p:sld xmlns:a="http://schemas.openxmlformats.org/drawingml/2006/main" xmlns:r="http://schemas.openxmlformats.org/officeDocument/2006/relationships" xmlns:p="http://schemas.openxmlformats.org/presentationml/2006/main">
+  <p:cSld>
+    <p:spTree>
+      <p:nvGrpSpPr>
+        <p:cNvPr id="1" name=""/>
+        <p:cNvGrpSpPr/>
+        <p:nvPr/>
+      </p:nvGrpSpPr>
+      <p:grpSpPr>
+        <a:xfrm>
+          <a:off x="0" y="0"/>
+          <a:ext cx="0" cy="0"/>
+          <a:chOff x="0" y="0"/>
+          <a:chExt cx="0" cy="0"/>
+        </a:xfrm>
+      </p:grpSpPr>
+      <p:pic>
+        <p:nvPicPr>
+          <p:cNvPr id="5122" name="Picture 2" descr="YES!! You're still awake! Any questions? - fist pump baby | Meme Generator">
+            <a:extLst>
+              <a:ext uri="{FF2B5EF4-FFF2-40B4-BE49-F238E27FC236}">
+                <a16:creationId xmlns:a16="http://schemas.microsoft.com/office/drawing/2014/main" id="{4287AC31-D018-4592-947A-C820F5B6FF59}"/>
+              </a:ext>
+            </a:extLst>
+          </p:cNvPr>
+          <p:cNvPicPr>
+            <a:picLocks noChangeAspect="1" noChangeArrowheads="1"/>
+          </p:cNvPicPr>
+          <p:nvPr/>
+        </p:nvPicPr>
+        <p:blipFill>
+          <a:blip r:embed="rId2">
+            <a:extLst>
+              <a:ext uri="{28A0092B-C50C-407E-A947-70E740481C1C}">
+                <a14:useLocalDpi xmlns:a14="http://schemas.microsoft.com/office/drawing/2010/main" val="0"/>
+              </a:ext>
+            </a:extLst>
+          </a:blip>
+          <a:srcRect/>
+          <a:stretch>
+            <a:fillRect/>
+          </a:stretch>
+        </p:blipFill>
+        <p:spPr bwMode="auto">
+          <a:xfrm>
+            <a:off x="2740025" y="920127"/>
+            <a:ext cx="6711950" cy="4427631"/>
+          </a:xfrm>
+          <a:prstGeom prst="rect">
+            <a:avLst/>
+          </a:prstGeom>
+          <a:noFill/>
+          <a:extLst>
+            <a:ext uri="{909E8E84-426E-40DD-AFC4-6F175D3DCCD1}">
+              <a14:hiddenFill xmlns:a14="http://schemas.microsoft.com/office/drawing/2010/main">
+                <a:solidFill>
+                  <a:srgbClr val="FFFFFF"/>
+                </a:solidFill>
+              </a14:hiddenFill>
+            </a:ext>
+          </a:extLst>
+        </p:spPr>
+      </p:pic>
+    </p:spTree>
+    <p:extLst>
+      <p:ext uri="{BB962C8B-B14F-4D97-AF65-F5344CB8AC3E}">
+        <p14:creationId xmlns:p14="http://schemas.microsoft.com/office/powerpoint/2010/main" val="3359363701"/>
       </p:ext>
     </p:extLst>
   </p:cSld>
@@ -7330,46 +9454,290 @@
       </p:grpSpPr>
       <p:sp>
         <p:nvSpPr>
-          <p:cNvPr id="2" name="Title 1"/>
-          <p:cNvSpPr>
-            <a:spLocks noGrp="1"/>
-          </p:cNvSpPr>
-          <p:nvPr>
-            <p:ph type="title"/>
-          </p:nvPr>
-        </p:nvSpPr>
-        <p:spPr/>
-        <p:txBody>
-          <a:bodyPr/>
-          <a:lstStyle/>
-          <a:p>
-            <a:endParaRPr lang="en-US"/>
-          </a:p>
-        </p:txBody>
-      </p:sp>
-      <p:sp>
-        <p:nvSpPr>
-          <p:cNvPr id="3" name="Text Placeholder 2"/>
-          <p:cNvSpPr>
-            <a:spLocks noGrp="1"/>
-          </p:cNvSpPr>
-          <p:nvPr>
-            <p:ph type="body" sz="quarter" idx="13"/>
-          </p:nvPr>
-        </p:nvSpPr>
-        <p:spPr/>
-        <p:txBody>
-          <a:bodyPr/>
-          <a:lstStyle/>
-          <a:p>
-            <a:endParaRPr lang="en-US"/>
+          <p:cNvPr id="2" name="Title 1">
+            <a:extLst>
+              <a:ext uri="{FF2B5EF4-FFF2-40B4-BE49-F238E27FC236}">
+                <a16:creationId xmlns:a16="http://schemas.microsoft.com/office/drawing/2014/main" id="{3079847A-E19C-4BC4-B9F0-296C0139B34D}"/>
+              </a:ext>
+            </a:extLst>
+          </p:cNvPr>
+          <p:cNvSpPr>
+            <a:spLocks noGrp="1"/>
+          </p:cNvSpPr>
+          <p:nvPr/>
+        </p:nvSpPr>
+        <p:spPr bwMode="gray">
+          <a:xfrm>
+            <a:off x="803493" y="910664"/>
+            <a:ext cx="4932661" cy="276999"/>
+          </a:xfrm>
+          <a:prstGeom prst="rect">
+            <a:avLst/>
+          </a:prstGeom>
+        </p:spPr>
+        <p:txBody>
+          <a:bodyPr vert="horz" wrap="square" lIns="0" tIns="0" rIns="0" bIns="0" rtlCol="0" anchor="b" anchorCtr="0">
+            <a:spAutoFit/>
+          </a:bodyPr>
+          <a:lstStyle>
+            <a:lvl1pPr algn="l" defTabSz="914400" rtl="0" eaLnBrk="1" latinLnBrk="0" hangingPunct="1">
+              <a:lnSpc>
+                <a:spcPct val="90000"/>
+              </a:lnSpc>
+              <a:spcBef>
+                <a:spcPct val="0"/>
+              </a:spcBef>
+              <a:buNone/>
+              <a:defRPr sz="1800" kern="1200" cap="all" spc="30" baseline="0">
+                <a:solidFill>
+                  <a:schemeClr val="tx1"/>
+                </a:solidFill>
+                <a:latin typeface="+mj-lt"/>
+                <a:ea typeface="+mj-ea"/>
+                <a:cs typeface="+mj-cs"/>
+              </a:defRPr>
+            </a:lvl1pPr>
+          </a:lstStyle>
+          <a:p>
+            <a:r>
+              <a:rPr lang="en-US" sz="2000" b="1" dirty="0"/>
+              <a:t>Agenda</a:t>
+            </a:r>
+          </a:p>
+        </p:txBody>
+      </p:sp>
+      <p:sp>
+        <p:nvSpPr>
+          <p:cNvPr id="3" name="TextBox 6">
+            <a:extLst>
+              <a:ext uri="{FF2B5EF4-FFF2-40B4-BE49-F238E27FC236}">
+                <a16:creationId xmlns:a16="http://schemas.microsoft.com/office/drawing/2014/main" id="{DC5DE1FB-B431-44F2-A65E-0CC83D71C85D}"/>
+              </a:ext>
+            </a:extLst>
+          </p:cNvPr>
+          <p:cNvSpPr txBox="1"/>
+          <p:nvPr/>
+        </p:nvSpPr>
+        <p:spPr bwMode="gray">
+          <a:xfrm>
+            <a:off x="1179172" y="2091109"/>
+            <a:ext cx="8805334" cy="3640227"/>
+          </a:xfrm>
+          <a:prstGeom prst="rect">
+            <a:avLst/>
+          </a:prstGeom>
+          <a:noFill/>
+        </p:spPr>
+        <p:txBody>
+          <a:bodyPr wrap="square" lIns="0" tIns="0" rIns="0" bIns="0" rtlCol="0">
+            <a:spAutoFit/>
+          </a:bodyPr>
+          <a:lstStyle>
+            <a:defPPr>
+              <a:defRPr lang="en-US"/>
+            </a:defPPr>
+            <a:lvl1pPr marL="0" algn="l" defTabSz="914400" rtl="0" eaLnBrk="1" latinLnBrk="0" hangingPunct="1">
+              <a:defRPr sz="1800" kern="1200">
+                <a:solidFill>
+                  <a:schemeClr val="tx1"/>
+                </a:solidFill>
+                <a:latin typeface="+mn-lt"/>
+                <a:ea typeface="+mn-ea"/>
+                <a:cs typeface="+mn-cs"/>
+              </a:defRPr>
+            </a:lvl1pPr>
+            <a:lvl2pPr marL="457200" algn="l" defTabSz="914400" rtl="0" eaLnBrk="1" latinLnBrk="0" hangingPunct="1">
+              <a:defRPr sz="1800" kern="1200">
+                <a:solidFill>
+                  <a:schemeClr val="tx1"/>
+                </a:solidFill>
+                <a:latin typeface="+mn-lt"/>
+                <a:ea typeface="+mn-ea"/>
+                <a:cs typeface="+mn-cs"/>
+              </a:defRPr>
+            </a:lvl2pPr>
+            <a:lvl3pPr marL="914400" algn="l" defTabSz="914400" rtl="0" eaLnBrk="1" latinLnBrk="0" hangingPunct="1">
+              <a:defRPr sz="1800" kern="1200">
+                <a:solidFill>
+                  <a:schemeClr val="tx1"/>
+                </a:solidFill>
+                <a:latin typeface="+mn-lt"/>
+                <a:ea typeface="+mn-ea"/>
+                <a:cs typeface="+mn-cs"/>
+              </a:defRPr>
+            </a:lvl3pPr>
+            <a:lvl4pPr marL="1371600" algn="l" defTabSz="914400" rtl="0" eaLnBrk="1" latinLnBrk="0" hangingPunct="1">
+              <a:defRPr sz="1800" kern="1200">
+                <a:solidFill>
+                  <a:schemeClr val="tx1"/>
+                </a:solidFill>
+                <a:latin typeface="+mn-lt"/>
+                <a:ea typeface="+mn-ea"/>
+                <a:cs typeface="+mn-cs"/>
+              </a:defRPr>
+            </a:lvl4pPr>
+            <a:lvl5pPr marL="1828800" algn="l" defTabSz="914400" rtl="0" eaLnBrk="1" latinLnBrk="0" hangingPunct="1">
+              <a:defRPr sz="1800" kern="1200">
+                <a:solidFill>
+                  <a:schemeClr val="tx1"/>
+                </a:solidFill>
+                <a:latin typeface="+mn-lt"/>
+                <a:ea typeface="+mn-ea"/>
+                <a:cs typeface="+mn-cs"/>
+              </a:defRPr>
+            </a:lvl5pPr>
+            <a:lvl6pPr marL="2286000" algn="l" defTabSz="914400" rtl="0" eaLnBrk="1" latinLnBrk="0" hangingPunct="1">
+              <a:defRPr sz="1800" kern="1200">
+                <a:solidFill>
+                  <a:schemeClr val="tx1"/>
+                </a:solidFill>
+                <a:latin typeface="+mn-lt"/>
+                <a:ea typeface="+mn-ea"/>
+                <a:cs typeface="+mn-cs"/>
+              </a:defRPr>
+            </a:lvl6pPr>
+            <a:lvl7pPr marL="2743200" algn="l" defTabSz="914400" rtl="0" eaLnBrk="1" latinLnBrk="0" hangingPunct="1">
+              <a:defRPr sz="1800" kern="1200">
+                <a:solidFill>
+                  <a:schemeClr val="tx1"/>
+                </a:solidFill>
+                <a:latin typeface="+mn-lt"/>
+                <a:ea typeface="+mn-ea"/>
+                <a:cs typeface="+mn-cs"/>
+              </a:defRPr>
+            </a:lvl7pPr>
+            <a:lvl8pPr marL="3200400" algn="l" defTabSz="914400" rtl="0" eaLnBrk="1" latinLnBrk="0" hangingPunct="1">
+              <a:defRPr sz="1800" kern="1200">
+                <a:solidFill>
+                  <a:schemeClr val="tx1"/>
+                </a:solidFill>
+                <a:latin typeface="+mn-lt"/>
+                <a:ea typeface="+mn-ea"/>
+                <a:cs typeface="+mn-cs"/>
+              </a:defRPr>
+            </a:lvl8pPr>
+            <a:lvl9pPr marL="3657600" algn="l" defTabSz="914400" rtl="0" eaLnBrk="1" latinLnBrk="0" hangingPunct="1">
+              <a:defRPr sz="1800" kern="1200">
+                <a:solidFill>
+                  <a:schemeClr val="tx1"/>
+                </a:solidFill>
+                <a:latin typeface="+mn-lt"/>
+                <a:ea typeface="+mn-ea"/>
+                <a:cs typeface="+mn-cs"/>
+              </a:defRPr>
+            </a:lvl9pPr>
+          </a:lstStyle>
+          <a:p>
+            <a:pPr>
+              <a:lnSpc>
+                <a:spcPct val="150000"/>
+              </a:lnSpc>
+              <a:spcBef>
+                <a:spcPts val="600"/>
+              </a:spcBef>
+            </a:pPr>
+            <a:r>
+              <a:rPr lang="en-US" sz="2400" dirty="0">
+                <a:solidFill>
+                  <a:schemeClr val="tx1"/>
+                </a:solidFill>
+              </a:rPr>
+              <a:t>Measure</a:t>
+            </a:r>
+          </a:p>
+          <a:p>
+            <a:pPr>
+              <a:lnSpc>
+                <a:spcPct val="150000"/>
+              </a:lnSpc>
+              <a:spcBef>
+                <a:spcPts val="600"/>
+              </a:spcBef>
+            </a:pPr>
+            <a:r>
+              <a:rPr lang="en-US" sz="2400" dirty="0">
+                <a:solidFill>
+                  <a:schemeClr val="tx1"/>
+                </a:solidFill>
+              </a:rPr>
+              <a:t>Repetition</a:t>
+            </a:r>
+          </a:p>
+          <a:p>
+            <a:pPr>
+              <a:lnSpc>
+                <a:spcPct val="150000"/>
+              </a:lnSpc>
+              <a:spcBef>
+                <a:spcPts val="600"/>
+              </a:spcBef>
+            </a:pPr>
+            <a:r>
+              <a:rPr lang="en-US" sz="2400" dirty="0"/>
+              <a:t>Cmdlets &amp; Modules</a:t>
+            </a:r>
+            <a:endParaRPr lang="en-US" sz="2400" dirty="0">
+              <a:solidFill>
+                <a:schemeClr val="tx1"/>
+              </a:solidFill>
+            </a:endParaRPr>
+          </a:p>
+          <a:p>
+            <a:pPr>
+              <a:lnSpc>
+                <a:spcPct val="150000"/>
+              </a:lnSpc>
+              <a:spcBef>
+                <a:spcPts val="600"/>
+              </a:spcBef>
+            </a:pPr>
+            <a:r>
+              <a:rPr lang="en-US" sz="2400" dirty="0"/>
+              <a:t>Get-View</a:t>
+            </a:r>
+          </a:p>
+          <a:p>
+            <a:pPr>
+              <a:lnSpc>
+                <a:spcPct val="150000"/>
+              </a:lnSpc>
+              <a:spcBef>
+                <a:spcPts val="600"/>
+              </a:spcBef>
+            </a:pPr>
+            <a:r>
+              <a:rPr lang="en-US" sz="2400" dirty="0">
+                <a:solidFill>
+                  <a:schemeClr val="tx1"/>
+                </a:solidFill>
+              </a:rPr>
+              <a:t>An Example (watch me make typos)</a:t>
+            </a:r>
+          </a:p>
+          <a:p>
+            <a:pPr>
+              <a:lnSpc>
+                <a:spcPct val="150000"/>
+              </a:lnSpc>
+              <a:spcBef>
+                <a:spcPts val="600"/>
+              </a:spcBef>
+            </a:pPr>
+            <a:r>
+              <a:rPr lang="en-US" sz="2400" dirty="0">
+                <a:solidFill>
+                  <a:schemeClr val="tx1"/>
+                </a:solidFill>
+              </a:rPr>
+              <a:t>Some (obligatory) takeaways</a:t>
+            </a:r>
           </a:p>
         </p:txBody>
       </p:sp>
     </p:spTree>
     <p:extLst>
       <p:ext uri="{BB962C8B-B14F-4D97-AF65-F5344CB8AC3E}">
-        <p14:creationId xmlns:p14="http://schemas.microsoft.com/office/powerpoint/2010/main" val="2448603535"/>
+        <p14:creationId xmlns:p14="http://schemas.microsoft.com/office/powerpoint/2010/main" val="795139880"/>
       </p:ext>
     </p:extLst>
   </p:cSld>
@@ -7406,12 +9774,171 @@
             <p:ph type="title"/>
           </p:nvPr>
         </p:nvSpPr>
+        <p:spPr>
+          <a:xfrm>
+            <a:off x="4675695" y="3879568"/>
+            <a:ext cx="6202837" cy="900246"/>
+          </a:xfrm>
+        </p:spPr>
+        <p:txBody>
+          <a:bodyPr/>
+          <a:lstStyle/>
+          <a:p>
+            <a:r>
+              <a:rPr lang="en-US" dirty="0"/>
+              <a:t>Measure</a:t>
+            </a:r>
+          </a:p>
+        </p:txBody>
+      </p:sp>
+      <p:sp>
+        <p:nvSpPr>
+          <p:cNvPr id="3" name="Text Placeholder 2"/>
+          <p:cNvSpPr>
+            <a:spLocks noGrp="1"/>
+          </p:cNvSpPr>
+          <p:nvPr>
+            <p:ph type="body" sz="quarter" idx="13"/>
+          </p:nvPr>
+        </p:nvSpPr>
+        <p:spPr>
+          <a:xfrm>
+            <a:off x="1185737" y="4891285"/>
+            <a:ext cx="2063750" cy="1384995"/>
+          </a:xfrm>
+        </p:spPr>
+        <p:txBody>
+          <a:bodyPr/>
+          <a:lstStyle/>
+          <a:p>
+            <a:r>
+              <a:rPr lang="en-US" dirty="0"/>
+              <a:t>1</a:t>
+            </a:r>
+          </a:p>
+        </p:txBody>
+      </p:sp>
+      <p:pic>
+        <p:nvPicPr>
+          <p:cNvPr id="5" name="Picture 4">
+            <a:extLst>
+              <a:ext uri="{FF2B5EF4-FFF2-40B4-BE49-F238E27FC236}">
+                <a16:creationId xmlns:a16="http://schemas.microsoft.com/office/drawing/2014/main" id="{F9248D13-9AF0-43C2-865B-40B99EA09CAF}"/>
+              </a:ext>
+            </a:extLst>
+          </p:cNvPr>
+          <p:cNvPicPr>
+            <a:picLocks noChangeAspect="1"/>
+          </p:cNvPicPr>
+          <p:nvPr/>
+        </p:nvPicPr>
+        <p:blipFill>
+          <a:blip r:embed="rId2"/>
+          <a:stretch>
+            <a:fillRect/>
+          </a:stretch>
+        </p:blipFill>
+        <p:spPr>
+          <a:xfrm>
+            <a:off x="5010549" y="5014670"/>
+            <a:ext cx="6145301" cy="774259"/>
+          </a:xfrm>
+          <a:prstGeom prst="rect">
+            <a:avLst/>
+          </a:prstGeom>
+        </p:spPr>
+      </p:pic>
+      <p:sp>
+        <p:nvSpPr>
+          <p:cNvPr id="7" name="TextBox 6">
+            <a:extLst>
+              <a:ext uri="{FF2B5EF4-FFF2-40B4-BE49-F238E27FC236}">
+                <a16:creationId xmlns:a16="http://schemas.microsoft.com/office/drawing/2014/main" id="{FC384030-D436-4FA3-BFC1-26A46A925C20}"/>
+              </a:ext>
+            </a:extLst>
+          </p:cNvPr>
+          <p:cNvSpPr txBox="1"/>
+          <p:nvPr/>
+        </p:nvSpPr>
+        <p:spPr bwMode="gray">
+          <a:xfrm>
+            <a:off x="9251450" y="5839119"/>
+            <a:ext cx="1296550" cy="369332"/>
+          </a:xfrm>
+          <a:prstGeom prst="rect">
+            <a:avLst/>
+          </a:prstGeom>
+          <a:noFill/>
+        </p:spPr>
+        <p:txBody>
+          <a:bodyPr wrap="square">
+            <a:spAutoFit/>
+          </a:bodyPr>
+          <a:lstStyle/>
+          <a:p>
+            <a:r>
+              <a:rPr lang="en-US" b="0" i="1" dirty="0">
+                <a:solidFill>
+                  <a:srgbClr val="333333"/>
+                </a:solidFill>
+                <a:effectLst/>
+                <a:latin typeface="Nunito"/>
+              </a:rPr>
+              <a:t>Lord Kelvin</a:t>
+            </a:r>
+            <a:endParaRPr lang="en-US" dirty="0"/>
+          </a:p>
+        </p:txBody>
+      </p:sp>
+    </p:spTree>
+    <p:extLst>
+      <p:ext uri="{BB962C8B-B14F-4D97-AF65-F5344CB8AC3E}">
+        <p14:creationId xmlns:p14="http://schemas.microsoft.com/office/powerpoint/2010/main" val="2448603535"/>
+      </p:ext>
+    </p:extLst>
+  </p:cSld>
+  <p:clrMapOvr>
+    <a:masterClrMapping/>
+  </p:clrMapOvr>
+</p:sld>
+</file>
+
+<file path=ppt/slides/slide5.xml><?xml version="1.0" encoding="utf-8"?>
+<p:sld xmlns:a="http://schemas.openxmlformats.org/drawingml/2006/main" xmlns:r="http://schemas.openxmlformats.org/officeDocument/2006/relationships" xmlns:p="http://schemas.openxmlformats.org/presentationml/2006/main">
+  <p:cSld>
+    <p:spTree>
+      <p:nvGrpSpPr>
+        <p:cNvPr id="1" name=""/>
+        <p:cNvGrpSpPr/>
+        <p:nvPr/>
+      </p:nvGrpSpPr>
+      <p:grpSpPr>
+        <a:xfrm>
+          <a:off x="0" y="0"/>
+          <a:ext cx="0" cy="0"/>
+          <a:chOff x="0" y="0"/>
+          <a:chExt cx="0" cy="0"/>
+        </a:xfrm>
+      </p:grpSpPr>
+      <p:sp>
+        <p:nvSpPr>
+          <p:cNvPr id="2" name="Title 1"/>
+          <p:cNvSpPr>
+            <a:spLocks noGrp="1"/>
+          </p:cNvSpPr>
+          <p:nvPr>
+            <p:ph type="title"/>
+          </p:nvPr>
+        </p:nvSpPr>
         <p:spPr/>
         <p:txBody>
           <a:bodyPr/>
           <a:lstStyle/>
           <a:p>
-            <a:endParaRPr lang="en-US"/>
+            <a:r>
+              <a:rPr lang="en-US" dirty="0"/>
+              <a:t>Techniques</a:t>
+            </a:r>
           </a:p>
         </p:txBody>
       </p:sp>
@@ -7430,7 +9957,83 @@
           <a:bodyPr/>
           <a:lstStyle/>
           <a:p>
-            <a:endParaRPr lang="en-US"/>
+            <a:r>
+              <a:rPr lang="en-US" dirty="0"/>
+              <a:t>Built-in</a:t>
+            </a:r>
+          </a:p>
+        </p:txBody>
+      </p:sp>
+      <p:sp>
+        <p:nvSpPr>
+          <p:cNvPr id="6" name="TextBox 5">
+            <a:extLst>
+              <a:ext uri="{FF2B5EF4-FFF2-40B4-BE49-F238E27FC236}">
+                <a16:creationId xmlns:a16="http://schemas.microsoft.com/office/drawing/2014/main" id="{FFA1F1C8-1E58-4DD0-AE0D-8E76C4355B98}"/>
+              </a:ext>
+            </a:extLst>
+          </p:cNvPr>
+          <p:cNvSpPr txBox="1"/>
+          <p:nvPr/>
+        </p:nvSpPr>
+        <p:spPr bwMode="gray">
+          <a:xfrm>
+            <a:off x="2128067" y="2004533"/>
+            <a:ext cx="5926666" cy="1905073"/>
+          </a:xfrm>
+          <a:prstGeom prst="rect">
+            <a:avLst/>
+          </a:prstGeom>
+          <a:noFill/>
+        </p:spPr>
+        <p:txBody>
+          <a:bodyPr wrap="square" lIns="0" tIns="0" rIns="0" bIns="0" rtlCol="0">
+            <a:spAutoFit/>
+          </a:bodyPr>
+          <a:lstStyle/>
+          <a:p>
+            <a:pPr>
+              <a:lnSpc>
+                <a:spcPct val="200000"/>
+              </a:lnSpc>
+              <a:spcBef>
+                <a:spcPts val="600"/>
+              </a:spcBef>
+            </a:pPr>
+            <a:r>
+              <a:rPr lang="en-US" sz="2000" dirty="0"/>
+              <a:t>Measure-Command</a:t>
+            </a:r>
+          </a:p>
+          <a:p>
+            <a:pPr>
+              <a:lnSpc>
+                <a:spcPct val="200000"/>
+              </a:lnSpc>
+              <a:spcBef>
+                <a:spcPts val="600"/>
+              </a:spcBef>
+            </a:pPr>
+            <a:r>
+              <a:rPr lang="en-US" sz="2000" dirty="0" err="1"/>
+              <a:t>DateTime</a:t>
+            </a:r>
+            <a:endParaRPr lang="en-US" sz="2000" dirty="0"/>
+          </a:p>
+          <a:p>
+            <a:pPr>
+              <a:lnSpc>
+                <a:spcPct val="200000"/>
+              </a:lnSpc>
+              <a:spcBef>
+                <a:spcPts val="600"/>
+              </a:spcBef>
+            </a:pPr>
+            <a:r>
+              <a:rPr lang="en-US" sz="2000" dirty="0" err="1"/>
+              <a:t>StopWatch</a:t>
+            </a:r>
+            <a:endParaRPr lang="en-US" sz="2000" dirty="0"/>
           </a:p>
         </p:txBody>
       </p:sp>
@@ -7438,6 +10041,372 @@
     <p:extLst>
       <p:ext uri="{BB962C8B-B14F-4D97-AF65-F5344CB8AC3E}">
         <p14:creationId xmlns:p14="http://schemas.microsoft.com/office/powerpoint/2010/main" val="3616891196"/>
+      </p:ext>
+    </p:extLst>
+  </p:cSld>
+  <p:clrMapOvr>
+    <a:masterClrMapping/>
+  </p:clrMapOvr>
+</p:sld>
+</file>
+
+<file path=ppt/slides/slide6.xml><?xml version="1.0" encoding="utf-8"?>
+<p:sld xmlns:a="http://schemas.openxmlformats.org/drawingml/2006/main" xmlns:r="http://schemas.openxmlformats.org/officeDocument/2006/relationships" xmlns:p="http://schemas.openxmlformats.org/presentationml/2006/main">
+  <p:cSld>
+    <p:spTree>
+      <p:nvGrpSpPr>
+        <p:cNvPr id="1" name=""/>
+        <p:cNvGrpSpPr/>
+        <p:nvPr/>
+      </p:nvGrpSpPr>
+      <p:grpSpPr>
+        <a:xfrm>
+          <a:off x="0" y="0"/>
+          <a:ext cx="0" cy="0"/>
+          <a:chOff x="0" y="0"/>
+          <a:chExt cx="0" cy="0"/>
+        </a:xfrm>
+      </p:grpSpPr>
+      <p:sp>
+        <p:nvSpPr>
+          <p:cNvPr id="2" name="Title 1"/>
+          <p:cNvSpPr>
+            <a:spLocks noGrp="1"/>
+          </p:cNvSpPr>
+          <p:nvPr>
+            <p:ph type="title"/>
+          </p:nvPr>
+        </p:nvSpPr>
+        <p:spPr/>
+        <p:txBody>
+          <a:bodyPr/>
+          <a:lstStyle/>
+          <a:p>
+            <a:r>
+              <a:rPr lang="en-US" dirty="0"/>
+              <a:t>Techniques</a:t>
+            </a:r>
+          </a:p>
+        </p:txBody>
+      </p:sp>
+      <p:sp>
+        <p:nvSpPr>
+          <p:cNvPr id="3" name="Text Placeholder 2"/>
+          <p:cNvSpPr>
+            <a:spLocks noGrp="1"/>
+          </p:cNvSpPr>
+          <p:nvPr>
+            <p:ph type="body" sz="quarter" idx="13"/>
+          </p:nvPr>
+        </p:nvSpPr>
+        <p:spPr/>
+        <p:txBody>
+          <a:bodyPr/>
+          <a:lstStyle/>
+          <a:p>
+            <a:r>
+              <a:rPr lang="en-US" dirty="0"/>
+              <a:t>Profiling</a:t>
+            </a:r>
+          </a:p>
+        </p:txBody>
+      </p:sp>
+      <p:sp>
+        <p:nvSpPr>
+          <p:cNvPr id="5" name="TextBox 4">
+            <a:extLst>
+              <a:ext uri="{FF2B5EF4-FFF2-40B4-BE49-F238E27FC236}">
+                <a16:creationId xmlns:a16="http://schemas.microsoft.com/office/drawing/2014/main" id="{03156F0F-F887-4C14-AEA2-B11C1716ADE0}"/>
+              </a:ext>
+            </a:extLst>
+          </p:cNvPr>
+          <p:cNvSpPr txBox="1"/>
+          <p:nvPr/>
+        </p:nvSpPr>
+        <p:spPr bwMode="gray">
+          <a:xfrm>
+            <a:off x="1868867" y="2119733"/>
+            <a:ext cx="5926666" cy="312330"/>
+          </a:xfrm>
+          <a:prstGeom prst="rect">
+            <a:avLst/>
+          </a:prstGeom>
+          <a:noFill/>
+        </p:spPr>
+        <p:txBody>
+          <a:bodyPr wrap="square" lIns="0" tIns="0" rIns="0" bIns="0" rtlCol="0">
+            <a:spAutoFit/>
+          </a:bodyPr>
+          <a:lstStyle/>
+          <a:p>
+            <a:pPr>
+              <a:lnSpc>
+                <a:spcPct val="110000"/>
+              </a:lnSpc>
+              <a:spcBef>
+                <a:spcPts val="600"/>
+              </a:spcBef>
+            </a:pPr>
+            <a:r>
+              <a:rPr lang="en-US" sz="2000" b="1" dirty="0"/>
+              <a:t>Chronometer</a:t>
+            </a:r>
+            <a:r>
+              <a:rPr lang="en-US" sz="2000" dirty="0"/>
+              <a:t> module by </a:t>
+            </a:r>
+            <a:r>
+              <a:rPr lang="en-US" sz="2000" dirty="0">
+                <a:hlinkClick r:id="rId2"/>
+              </a:rPr>
+              <a:t>Kevin Marquette</a:t>
+            </a:r>
+            <a:endParaRPr lang="en-US" sz="2000" dirty="0"/>
+          </a:p>
+        </p:txBody>
+      </p:sp>
+    </p:spTree>
+    <p:extLst>
+      <p:ext uri="{BB962C8B-B14F-4D97-AF65-F5344CB8AC3E}">
+        <p14:creationId xmlns:p14="http://schemas.microsoft.com/office/powerpoint/2010/main" val="2286596655"/>
+      </p:ext>
+    </p:extLst>
+  </p:cSld>
+  <p:clrMapOvr>
+    <a:masterClrMapping/>
+  </p:clrMapOvr>
+</p:sld>
+</file>
+
+<file path=ppt/slides/slide7.xml><?xml version="1.0" encoding="utf-8"?>
+<p:sld xmlns:a="http://schemas.openxmlformats.org/drawingml/2006/main" xmlns:r="http://schemas.openxmlformats.org/officeDocument/2006/relationships" xmlns:p="http://schemas.openxmlformats.org/presentationml/2006/main">
+  <p:cSld>
+    <p:spTree>
+      <p:nvGrpSpPr>
+        <p:cNvPr id="1" name=""/>
+        <p:cNvGrpSpPr/>
+        <p:nvPr/>
+      </p:nvGrpSpPr>
+      <p:grpSpPr>
+        <a:xfrm>
+          <a:off x="0" y="0"/>
+          <a:ext cx="0" cy="0"/>
+          <a:chOff x="0" y="0"/>
+          <a:chExt cx="0" cy="0"/>
+        </a:xfrm>
+      </p:grpSpPr>
+      <p:pic>
+        <p:nvPicPr>
+          <p:cNvPr id="1026" name="Picture 2" descr="Frontend Unit Testing">
+            <a:extLst>
+              <a:ext uri="{FF2B5EF4-FFF2-40B4-BE49-F238E27FC236}">
+                <a16:creationId xmlns:a16="http://schemas.microsoft.com/office/drawing/2014/main" id="{F124C613-AD3B-4B8A-9522-882B755DB2D0}"/>
+              </a:ext>
+            </a:extLst>
+          </p:cNvPr>
+          <p:cNvPicPr>
+            <a:picLocks noChangeAspect="1" noChangeArrowheads="1"/>
+          </p:cNvPicPr>
+          <p:nvPr/>
+        </p:nvPicPr>
+        <p:blipFill>
+          <a:blip r:embed="rId2">
+            <a:extLst>
+              <a:ext uri="{28A0092B-C50C-407E-A947-70E740481C1C}">
+                <a14:useLocalDpi xmlns:a14="http://schemas.microsoft.com/office/drawing/2010/main" val="0"/>
+              </a:ext>
+            </a:extLst>
+          </a:blip>
+          <a:srcRect/>
+          <a:stretch>
+            <a:fillRect/>
+          </a:stretch>
+        </p:blipFill>
+        <p:spPr bwMode="auto">
+          <a:xfrm>
+            <a:off x="4159779" y="1236757"/>
+            <a:ext cx="3872442" cy="4026865"/>
+          </a:xfrm>
+          <a:prstGeom prst="rect">
+            <a:avLst/>
+          </a:prstGeom>
+          <a:noFill/>
+          <a:extLst>
+            <a:ext uri="{909E8E84-426E-40DD-AFC4-6F175D3DCCD1}">
+              <a14:hiddenFill xmlns:a14="http://schemas.microsoft.com/office/drawing/2010/main">
+                <a:solidFill>
+                  <a:srgbClr val="FFFFFF"/>
+                </a:solidFill>
+              </a14:hiddenFill>
+            </a:ext>
+          </a:extLst>
+        </p:spPr>
+      </p:pic>
+    </p:spTree>
+    <p:extLst>
+      <p:ext uri="{BB962C8B-B14F-4D97-AF65-F5344CB8AC3E}">
+        <p14:creationId xmlns:p14="http://schemas.microsoft.com/office/powerpoint/2010/main" val="2390783484"/>
+      </p:ext>
+    </p:extLst>
+  </p:cSld>
+  <p:clrMapOvr>
+    <a:masterClrMapping/>
+  </p:clrMapOvr>
+</p:sld>
+</file>
+
+<file path=ppt/slides/slide8.xml><?xml version="1.0" encoding="utf-8"?>
+<p:sld xmlns:a="http://schemas.openxmlformats.org/drawingml/2006/main" xmlns:r="http://schemas.openxmlformats.org/officeDocument/2006/relationships" xmlns:p="http://schemas.openxmlformats.org/presentationml/2006/main">
+  <p:cSld>
+    <p:spTree>
+      <p:nvGrpSpPr>
+        <p:cNvPr id="1" name=""/>
+        <p:cNvGrpSpPr/>
+        <p:nvPr/>
+      </p:nvGrpSpPr>
+      <p:grpSpPr>
+        <a:xfrm>
+          <a:off x="0" y="0"/>
+          <a:ext cx="0" cy="0"/>
+          <a:chOff x="0" y="0"/>
+          <a:chExt cx="0" cy="0"/>
+        </a:xfrm>
+      </p:grpSpPr>
+      <p:sp>
+        <p:nvSpPr>
+          <p:cNvPr id="2" name="Title 1"/>
+          <p:cNvSpPr>
+            <a:spLocks noGrp="1"/>
+          </p:cNvSpPr>
+          <p:nvPr>
+            <p:ph type="title"/>
+          </p:nvPr>
+        </p:nvSpPr>
+        <p:spPr>
+          <a:xfrm>
+            <a:off x="4675695" y="3879568"/>
+            <a:ext cx="6202837" cy="900246"/>
+          </a:xfrm>
+        </p:spPr>
+        <p:txBody>
+          <a:bodyPr/>
+          <a:lstStyle/>
+          <a:p>
+            <a:r>
+              <a:rPr lang="en-US" dirty="0"/>
+              <a:t>Repetition</a:t>
+            </a:r>
+          </a:p>
+        </p:txBody>
+      </p:sp>
+      <p:sp>
+        <p:nvSpPr>
+          <p:cNvPr id="3" name="Text Placeholder 2"/>
+          <p:cNvSpPr>
+            <a:spLocks noGrp="1"/>
+          </p:cNvSpPr>
+          <p:nvPr>
+            <p:ph type="body" sz="quarter" idx="13"/>
+          </p:nvPr>
+        </p:nvSpPr>
+        <p:spPr>
+          <a:xfrm>
+            <a:off x="1185737" y="4891285"/>
+            <a:ext cx="2063750" cy="1384995"/>
+          </a:xfrm>
+        </p:spPr>
+        <p:txBody>
+          <a:bodyPr/>
+          <a:lstStyle/>
+          <a:p>
+            <a:r>
+              <a:rPr lang="en-US" dirty="0"/>
+              <a:t>2</a:t>
+            </a:r>
+          </a:p>
+        </p:txBody>
+      </p:sp>
+    </p:spTree>
+    <p:extLst>
+      <p:ext uri="{BB962C8B-B14F-4D97-AF65-F5344CB8AC3E}">
+        <p14:creationId xmlns:p14="http://schemas.microsoft.com/office/powerpoint/2010/main" val="2961835858"/>
+      </p:ext>
+    </p:extLst>
+  </p:cSld>
+  <p:clrMapOvr>
+    <a:masterClrMapping/>
+  </p:clrMapOvr>
+</p:sld>
+</file>
+
+<file path=ppt/slides/slide9.xml><?xml version="1.0" encoding="utf-8"?>
+<p:sld xmlns:a="http://schemas.openxmlformats.org/drawingml/2006/main" xmlns:r="http://schemas.openxmlformats.org/officeDocument/2006/relationships" xmlns:p="http://schemas.openxmlformats.org/presentationml/2006/main">
+  <p:cSld>
+    <p:spTree>
+      <p:nvGrpSpPr>
+        <p:cNvPr id="1" name=""/>
+        <p:cNvGrpSpPr/>
+        <p:nvPr/>
+      </p:nvGrpSpPr>
+      <p:grpSpPr>
+        <a:xfrm>
+          <a:off x="0" y="0"/>
+          <a:ext cx="0" cy="0"/>
+          <a:chOff x="0" y="0"/>
+          <a:chExt cx="0" cy="0"/>
+        </a:xfrm>
+      </p:grpSpPr>
+      <p:pic>
+        <p:nvPicPr>
+          <p:cNvPr id="2050" name="Picture 2" descr="Meme Creator - Funny Demo Time Meme Generator at MemeCreator.org!">
+            <a:extLst>
+              <a:ext uri="{FF2B5EF4-FFF2-40B4-BE49-F238E27FC236}">
+                <a16:creationId xmlns:a16="http://schemas.microsoft.com/office/drawing/2014/main" id="{2858FCBA-1927-420B-9A5F-CEF996534746}"/>
+              </a:ext>
+            </a:extLst>
+          </p:cNvPr>
+          <p:cNvPicPr>
+            <a:picLocks noChangeAspect="1" noChangeArrowheads="1"/>
+          </p:cNvPicPr>
+          <p:nvPr/>
+        </p:nvPicPr>
+        <p:blipFill>
+          <a:blip r:embed="rId2">
+            <a:extLst>
+              <a:ext uri="{28A0092B-C50C-407E-A947-70E740481C1C}">
+                <a14:useLocalDpi xmlns:a14="http://schemas.microsoft.com/office/drawing/2010/main" val="0"/>
+              </a:ext>
+            </a:extLst>
+          </a:blip>
+          <a:srcRect/>
+          <a:stretch>
+            <a:fillRect/>
+          </a:stretch>
+        </p:blipFill>
+        <p:spPr bwMode="auto">
+          <a:xfrm>
+            <a:off x="4085696" y="990599"/>
+            <a:ext cx="4020608" cy="4594981"/>
+          </a:xfrm>
+          <a:prstGeom prst="rect">
+            <a:avLst/>
+          </a:prstGeom>
+          <a:noFill/>
+          <a:extLst>
+            <a:ext uri="{909E8E84-426E-40DD-AFC4-6F175D3DCCD1}">
+              <a14:hiddenFill xmlns:a14="http://schemas.microsoft.com/office/drawing/2010/main">
+                <a:solidFill>
+                  <a:srgbClr val="FFFFFF"/>
+                </a:solidFill>
+              </a14:hiddenFill>
+            </a:ext>
+          </a:extLst>
+        </p:spPr>
+      </p:pic>
+    </p:spTree>
+    <p:extLst>
+      <p:ext uri="{BB962C8B-B14F-4D97-AF65-F5344CB8AC3E}">
+        <p14:creationId xmlns:p14="http://schemas.microsoft.com/office/powerpoint/2010/main" val="2910040833"/>
       </p:ext>
     </p:extLst>
   </p:cSld>
@@ -8084,6 +11053,21 @@
 </file>
 
 <file path=customXml/item1.xml><?xml version="1.0" encoding="utf-8"?>
+<?mso-contentType ?>
+<FormTemplates xmlns="http://schemas.microsoft.com/sharepoint/v3/contenttype/forms">
+  <Display>DocumentLibraryForm</Display>
+  <Edit>DocumentLibraryForm</Edit>
+  <New>DocumentLibraryForm</New>
+</FormTemplates>
+</file>
+
+<file path=customXml/item2.xml><?xml version="1.0" encoding="utf-8"?>
+<p:properties xmlns:p="http://schemas.microsoft.com/office/2006/metadata/properties" xmlns:xsi="http://www.w3.org/2001/XMLSchema-instance" xmlns:pc="http://schemas.microsoft.com/office/infopath/2007/PartnerControls">
+  <documentManagement/>
+</p:properties>
+</file>
+
+<file path=customXml/item3.xml><?xml version="1.0" encoding="utf-8"?>
 <ct:contentTypeSchema xmlns:ct="http://schemas.microsoft.com/office/2006/metadata/contentType" xmlns:ma="http://schemas.microsoft.com/office/2006/metadata/properties/metaAttributes" ct:_="" ma:_="" ma:contentTypeName="Document" ma:contentTypeID="0x0101004CCD5B73FBE51B4A85B46DE0A90EC775" ma:contentTypeVersion="12" ma:contentTypeDescription="Een nieuw document maken." ma:contentTypeScope="" ma:versionID="8e2e31c1df95102ce9a489601af5ee6a">
   <xsd:schema xmlns:xsd="http://www.w3.org/2001/XMLSchema" xmlns:xs="http://www.w3.org/2001/XMLSchema" xmlns:p="http://schemas.microsoft.com/office/2006/metadata/properties" xmlns:ns2="89f75848-85bc-4758-93d1-9e16b038e984" xmlns:ns3="6e0eb923-63b6-4e89-a80b-cb95c89bfa27" targetNamespace="http://schemas.microsoft.com/office/2006/metadata/properties" ma:root="true" ma:fieldsID="3ec8ff12976f8bdd74458b2faea5a275" ns2:_="" ns3:_="">
     <xsd:import namespace="89f75848-85bc-4758-93d1-9e16b038e984"/>
@@ -8300,36 +11284,10 @@
 </ct:contentTypeSchema>
 </file>
 
-<file path=customXml/item2.xml><?xml version="1.0" encoding="utf-8"?>
-<p:properties xmlns:p="http://schemas.microsoft.com/office/2006/metadata/properties" xmlns:xsi="http://www.w3.org/2001/XMLSchema-instance" xmlns:pc="http://schemas.microsoft.com/office/infopath/2007/PartnerControls">
-  <documentManagement/>
-</p:properties>
-</file>
-
-<file path=customXml/item3.xml><?xml version="1.0" encoding="utf-8"?>
-<?mso-contentType ?>
-<FormTemplates xmlns="http://schemas.microsoft.com/sharepoint/v3/contenttype/forms">
-  <Display>DocumentLibraryForm</Display>
-  <Edit>DocumentLibraryForm</Edit>
-  <New>DocumentLibraryForm</New>
-</FormTemplates>
-</file>
-
 <file path=customXml/itemProps1.xml><?xml version="1.0" encoding="utf-8"?>
-<ds:datastoreItem xmlns:ds="http://schemas.openxmlformats.org/officeDocument/2006/customXml" ds:itemID="{B8C6ACD0-EEDB-4736-8BF5-A25C9ABAA552}">
+<ds:datastoreItem xmlns:ds="http://schemas.openxmlformats.org/officeDocument/2006/customXml" ds:itemID="{22944A3D-C3E2-4FF1-B106-7269F0FBD5AE}">
   <ds:schemaRefs>
-    <ds:schemaRef ds:uri="http://schemas.microsoft.com/office/2006/metadata/contentType"/>
-    <ds:schemaRef ds:uri="http://schemas.microsoft.com/office/2006/metadata/properties/metaAttributes"/>
-    <ds:schemaRef ds:uri="http://www.w3.org/2001/XMLSchema"/>
-    <ds:schemaRef ds:uri="http://schemas.microsoft.com/office/2006/metadata/properties"/>
-    <ds:schemaRef ds:uri="89f75848-85bc-4758-93d1-9e16b038e984"/>
-    <ds:schemaRef ds:uri="6e0eb923-63b6-4e89-a80b-cb95c89bfa27"/>
-    <ds:schemaRef ds:uri="http://schemas.microsoft.com/office/2006/documentManagement/types"/>
-    <ds:schemaRef ds:uri="http://schemas.microsoft.com/office/infopath/2007/PartnerControls"/>
-    <ds:schemaRef ds:uri="http://schemas.openxmlformats.org/package/2006/metadata/core-properties"/>
-    <ds:schemaRef ds:uri="http://purl.org/dc/elements/1.1/"/>
-    <ds:schemaRef ds:uri="http://purl.org/dc/terms/"/>
-    <ds:schemaRef ds:uri="http://schemas.microsoft.com/internal/obd"/>
+    <ds:schemaRef ds:uri="http://schemas.microsoft.com/sharepoint/v3/contenttype/forms"/>
   </ds:schemaRefs>
 </ds:datastoreItem>
 </file>
@@ -8352,9 +11310,20 @@
 </file>
 
 <file path=customXml/itemProps3.xml><?xml version="1.0" encoding="utf-8"?>
-<ds:datastoreItem xmlns:ds="http://schemas.openxmlformats.org/officeDocument/2006/customXml" ds:itemID="{22944A3D-C3E2-4FF1-B106-7269F0FBD5AE}">
+<ds:datastoreItem xmlns:ds="http://schemas.openxmlformats.org/officeDocument/2006/customXml" ds:itemID="{B8C6ACD0-EEDB-4736-8BF5-A25C9ABAA552}">
   <ds:schemaRefs>
-    <ds:schemaRef ds:uri="http://schemas.microsoft.com/sharepoint/v3/contenttype/forms"/>
+    <ds:schemaRef ds:uri="http://schemas.microsoft.com/office/2006/metadata/contentType"/>
+    <ds:schemaRef ds:uri="http://schemas.microsoft.com/office/2006/metadata/properties/metaAttributes"/>
+    <ds:schemaRef ds:uri="http://www.w3.org/2001/XMLSchema"/>
+    <ds:schemaRef ds:uri="http://schemas.microsoft.com/office/2006/metadata/properties"/>
+    <ds:schemaRef ds:uri="89f75848-85bc-4758-93d1-9e16b038e984"/>
+    <ds:schemaRef ds:uri="6e0eb923-63b6-4e89-a80b-cb95c89bfa27"/>
+    <ds:schemaRef ds:uri="http://schemas.microsoft.com/office/2006/documentManagement/types"/>
+    <ds:schemaRef ds:uri="http://schemas.microsoft.com/office/infopath/2007/PartnerControls"/>
+    <ds:schemaRef ds:uri="http://schemas.openxmlformats.org/package/2006/metadata/core-properties"/>
+    <ds:schemaRef ds:uri="http://purl.org/dc/elements/1.1/"/>
+    <ds:schemaRef ds:uri="http://purl.org/dc/terms/"/>
+    <ds:schemaRef ds:uri="http://schemas.microsoft.com/internal/obd"/>
   </ds:schemaRefs>
 </ds:datastoreItem>
 </file>
</xml_diff>